<commit_message>
Add week 10 slides
</commit_message>
<xml_diff>
--- a/Tutorial 8/Tutorial 8 - Counting and Probability.pptx
+++ b/Tutorial 8/Tutorial 8 - Counting and Probability.pptx
@@ -9,6 +9,10 @@
     <p:sldId id="258" r:id="rId3"/>
     <p:sldId id="259" r:id="rId4"/>
     <p:sldId id="260" r:id="rId5"/>
+    <p:sldId id="261" r:id="rId6"/>
+    <p:sldId id="262" r:id="rId7"/>
+    <p:sldId id="263" r:id="rId8"/>
+    <p:sldId id="264" r:id="rId9"/>
   </p:sldIdLst>
   <p:sldSz cx="12192000" cy="6858000"/>
   <p:notesSz cx="6858000" cy="9144000"/>
@@ -341,7 +345,7 @@
           <a:p>
             <a:fld id="{4F1121E5-844A-48A0-AEA1-923C9811B672}" type="datetimeFigureOut">
               <a:rPr lang="en-MY" smtClean="0"/>
-              <a:t>15/10/2018</a:t>
+              <a:t>22/10/2018</a:t>
             </a:fld>
             <a:endParaRPr lang="en-MY"/>
           </a:p>
@@ -549,7 +553,7 @@
           <a:p>
             <a:fld id="{4F1121E5-844A-48A0-AEA1-923C9811B672}" type="datetimeFigureOut">
               <a:rPr lang="en-MY" smtClean="0"/>
-              <a:t>15/10/2018</a:t>
+              <a:t>22/10/2018</a:t>
             </a:fld>
             <a:endParaRPr lang="en-MY"/>
           </a:p>
@@ -805,7 +809,7 @@
           <a:p>
             <a:fld id="{4F1121E5-844A-48A0-AEA1-923C9811B672}" type="datetimeFigureOut">
               <a:rPr lang="en-MY" smtClean="0"/>
-              <a:t>15/10/2018</a:t>
+              <a:t>22/10/2018</a:t>
             </a:fld>
             <a:endParaRPr lang="en-MY"/>
           </a:p>
@@ -975,7 +979,7 @@
           <a:p>
             <a:fld id="{4F1121E5-844A-48A0-AEA1-923C9811B672}" type="datetimeFigureOut">
               <a:rPr lang="en-MY" smtClean="0"/>
-              <a:t>15/10/2018</a:t>
+              <a:t>22/10/2018</a:t>
             </a:fld>
             <a:endParaRPr lang="en-MY"/>
           </a:p>
@@ -1318,7 +1322,7 @@
           <a:p>
             <a:fld id="{4F1121E5-844A-48A0-AEA1-923C9811B672}" type="datetimeFigureOut">
               <a:rPr lang="en-MY" smtClean="0"/>
-              <a:t>15/10/2018</a:t>
+              <a:t>22/10/2018</a:t>
             </a:fld>
             <a:endParaRPr lang="en-MY"/>
           </a:p>
@@ -1593,7 +1597,7 @@
           <a:p>
             <a:fld id="{4F1121E5-844A-48A0-AEA1-923C9811B672}" type="datetimeFigureOut">
               <a:rPr lang="en-MY" smtClean="0"/>
-              <a:t>15/10/2018</a:t>
+              <a:t>22/10/2018</a:t>
             </a:fld>
             <a:endParaRPr lang="en-MY"/>
           </a:p>
@@ -1972,7 +1976,7 @@
           <a:p>
             <a:fld id="{4F1121E5-844A-48A0-AEA1-923C9811B672}" type="datetimeFigureOut">
               <a:rPr lang="en-MY" smtClean="0"/>
-              <a:t>15/10/2018</a:t>
+              <a:t>22/10/2018</a:t>
             </a:fld>
             <a:endParaRPr lang="en-MY"/>
           </a:p>
@@ -2090,7 +2094,7 @@
           <a:p>
             <a:fld id="{4F1121E5-844A-48A0-AEA1-923C9811B672}" type="datetimeFigureOut">
               <a:rPr lang="en-MY" smtClean="0"/>
-              <a:t>15/10/2018</a:t>
+              <a:t>22/10/2018</a:t>
             </a:fld>
             <a:endParaRPr lang="en-MY"/>
           </a:p>
@@ -2261,7 +2265,7 @@
           <a:p>
             <a:fld id="{4F1121E5-844A-48A0-AEA1-923C9811B672}" type="datetimeFigureOut">
               <a:rPr lang="en-MY" smtClean="0"/>
-              <a:t>15/10/2018</a:t>
+              <a:t>22/10/2018</a:t>
             </a:fld>
             <a:endParaRPr lang="en-MY"/>
           </a:p>
@@ -2615,7 +2619,7 @@
           <a:p>
             <a:fld id="{4F1121E5-844A-48A0-AEA1-923C9811B672}" type="datetimeFigureOut">
               <a:rPr lang="en-MY" smtClean="0"/>
-              <a:t>15/10/2018</a:t>
+              <a:t>22/10/2018</a:t>
             </a:fld>
             <a:endParaRPr lang="en-MY"/>
           </a:p>
@@ -2992,7 +2996,7 @@
           <a:p>
             <a:fld id="{4F1121E5-844A-48A0-AEA1-923C9811B672}" type="datetimeFigureOut">
               <a:rPr lang="en-MY" smtClean="0"/>
-              <a:t>15/10/2018</a:t>
+              <a:t>22/10/2018</a:t>
             </a:fld>
             <a:endParaRPr lang="en-MY"/>
           </a:p>
@@ -3279,7 +3283,7 @@
           <a:p>
             <a:fld id="{4F1121E5-844A-48A0-AEA1-923C9811B672}" type="datetimeFigureOut">
               <a:rPr lang="en-MY" smtClean="0"/>
-              <a:t>15/10/2018</a:t>
+              <a:t>22/10/2018</a:t>
             </a:fld>
             <a:endParaRPr lang="en-MY"/>
           </a:p>
@@ -3826,7 +3830,7 @@
           <a:p>
             <a:r>
               <a:rPr lang="en-MY" dirty="0"/>
-              <a:t>CS1231 Tutorial 7	</a:t>
+              <a:t>CS1231 Tutorial 8	</a:t>
             </a:r>
           </a:p>
         </p:txBody>
@@ -3854,7 +3858,7 @@
           <a:p>
             <a:r>
               <a:rPr lang="en-MY" dirty="0"/>
-              <a:t>AY18/19 – WEEK 9</a:t>
+              <a:t>AY18/19 – WEEK 10</a:t>
             </a:r>
           </a:p>
           <a:p>
@@ -3924,7 +3928,7 @@
           <a:p>
             <a:r>
               <a:rPr lang="en-MY" dirty="0"/>
-              <a:t>Functions</a:t>
+              <a:t>Probability	</a:t>
             </a:r>
           </a:p>
         </p:txBody>
@@ -3959,7 +3963,26 @@
               <a:rPr lang="en-MY" sz="3200" dirty="0">
                 <a:ea typeface="Cambria Math" panose="02040503050406030204" pitchFamily="18" charset="0"/>
               </a:rPr>
-              <a:t>Functions are relations such that each “input” to the function must have only one output.</a:t>
+              <a:t>Probability is a measure of the likelihood that an event will occur</a:t>
+            </a:r>
+          </a:p>
+          <a:p>
+            <a:pPr marL="0" indent="0">
+              <a:buNone/>
+            </a:pPr>
+            <a:endParaRPr lang="en-MY" sz="3200" b="0" dirty="0">
+              <a:ea typeface="Cambria Math" panose="02040503050406030204" pitchFamily="18" charset="0"/>
+            </a:endParaRPr>
+          </a:p>
+          <a:p>
+            <a:pPr marL="0" indent="0">
+              <a:buNone/>
+            </a:pPr>
+            <a:r>
+              <a:rPr lang="en-MY" sz="3200" dirty="0">
+                <a:ea typeface="Cambria Math" panose="02040503050406030204" pitchFamily="18" charset="0"/>
+              </a:rPr>
+              <a:t>Counting refers to the techniques used to count the set of possible outcomes</a:t>
             </a:r>
             <a:endParaRPr lang="en-MY" sz="3200" b="0" dirty="0">
               <a:ea typeface="Cambria Math" panose="02040503050406030204" pitchFamily="18" charset="0"/>
@@ -4023,7 +4046,128 @@
           <a:p>
             <a:r>
               <a:rPr lang="en-MY" dirty="0"/>
-              <a:t>Function properties</a:t>
+              <a:t>Possibility trees</a:t>
+            </a:r>
+          </a:p>
+        </p:txBody>
+      </p:sp>
+      <p:sp>
+        <p:nvSpPr>
+          <p:cNvPr id="3" name="Content Placeholder 2">
+            <a:extLst>
+              <a:ext uri="{FF2B5EF4-FFF2-40B4-BE49-F238E27FC236}">
+                <a16:creationId xmlns:a16="http://schemas.microsoft.com/office/drawing/2014/main" id="{7A200C48-F6E6-438D-8B6C-3933FFD4DEBF}"/>
+              </a:ext>
+            </a:extLst>
+          </p:cNvPr>
+          <p:cNvSpPr>
+            <a:spLocks noGrp="1"/>
+          </p:cNvSpPr>
+          <p:nvPr>
+            <p:ph idx="1"/>
+          </p:nvPr>
+        </p:nvSpPr>
+        <p:spPr/>
+        <p:txBody>
+          <a:bodyPr>
+            <a:normAutofit/>
+          </a:bodyPr>
+          <a:lstStyle/>
+          <a:p>
+            <a:pPr marL="0" indent="0">
+              <a:buNone/>
+            </a:pPr>
+            <a:r>
+              <a:rPr lang="en-MY" sz="3200" dirty="0"/>
+              <a:t>E.g. Flipping 3 coins</a:t>
+            </a:r>
+          </a:p>
+        </p:txBody>
+      </p:sp>
+      <p:pic>
+        <p:nvPicPr>
+          <p:cNvPr id="4" name="Picture 3">
+            <a:extLst>
+              <a:ext uri="{FF2B5EF4-FFF2-40B4-BE49-F238E27FC236}">
+                <a16:creationId xmlns:a16="http://schemas.microsoft.com/office/drawing/2014/main" id="{7024614F-5157-4EBB-8D5B-9A2D400BD2B2}"/>
+              </a:ext>
+            </a:extLst>
+          </p:cNvPr>
+          <p:cNvPicPr>
+            <a:picLocks noChangeAspect="1"/>
+          </p:cNvPicPr>
+          <p:nvPr/>
+        </p:nvPicPr>
+        <p:blipFill>
+          <a:blip r:embed="rId2"/>
+          <a:stretch>
+            <a:fillRect/>
+          </a:stretch>
+        </p:blipFill>
+        <p:spPr>
+          <a:xfrm>
+            <a:off x="2590849" y="2524727"/>
+            <a:ext cx="7267759" cy="3269682"/>
+          </a:xfrm>
+          <a:prstGeom prst="rect">
+            <a:avLst/>
+          </a:prstGeom>
+        </p:spPr>
+      </p:pic>
+    </p:spTree>
+    <p:extLst>
+      <p:ext uri="{BB962C8B-B14F-4D97-AF65-F5344CB8AC3E}">
+        <p14:creationId xmlns:p14="http://schemas.microsoft.com/office/powerpoint/2010/main" val="713865108"/>
+      </p:ext>
+    </p:extLst>
+  </p:cSld>
+  <p:clrMapOvr>
+    <a:masterClrMapping/>
+  </p:clrMapOvr>
+</p:sld>
+</file>
+
+<file path=ppt/slides/slide4.xml><?xml version="1.0" encoding="utf-8"?>
+<p:sld xmlns:a="http://schemas.openxmlformats.org/drawingml/2006/main" xmlns:r="http://schemas.openxmlformats.org/officeDocument/2006/relationships" xmlns:p="http://schemas.openxmlformats.org/presentationml/2006/main">
+  <p:cSld>
+    <p:spTree>
+      <p:nvGrpSpPr>
+        <p:cNvPr id="1" name=""/>
+        <p:cNvGrpSpPr/>
+        <p:nvPr/>
+      </p:nvGrpSpPr>
+      <p:grpSpPr>
+        <a:xfrm>
+          <a:off x="0" y="0"/>
+          <a:ext cx="0" cy="0"/>
+          <a:chOff x="0" y="0"/>
+          <a:chExt cx="0" cy="0"/>
+        </a:xfrm>
+      </p:grpSpPr>
+      <p:sp>
+        <p:nvSpPr>
+          <p:cNvPr id="2" name="Title 1">
+            <a:extLst>
+              <a:ext uri="{FF2B5EF4-FFF2-40B4-BE49-F238E27FC236}">
+                <a16:creationId xmlns:a16="http://schemas.microsoft.com/office/drawing/2014/main" id="{2B3B7CF7-821D-432B-AB6B-521D80545732}"/>
+              </a:ext>
+            </a:extLst>
+          </p:cNvPr>
+          <p:cNvSpPr>
+            <a:spLocks noGrp="1"/>
+          </p:cNvSpPr>
+          <p:nvPr>
+            <p:ph type="title"/>
+          </p:nvPr>
+        </p:nvSpPr>
+        <p:spPr/>
+        <p:txBody>
+          <a:bodyPr/>
+          <a:lstStyle/>
+          <a:p>
+            <a:r>
+              <a:rPr lang="en-MY" dirty="0"/>
+              <a:t>Multiplication rule</a:t>
             </a:r>
           </a:p>
         </p:txBody>
@@ -4060,47 +4204,105 @@
                   <a:rPr lang="en-MY" sz="3200" dirty="0">
                     <a:ea typeface="Cambria Math" panose="02040503050406030204" pitchFamily="18" charset="0"/>
                   </a:rPr>
-                  <a:t>For a function </a:t>
+                  <a:t>If an operation consists of k steps, and</a:t>
+                </a:r>
+              </a:p>
+              <a:p>
+                <a:pPr marL="0" indent="0">
+                  <a:buNone/>
+                </a:pPr>
+                <a:r>
+                  <a:rPr lang="en-MY" sz="3200" dirty="0">
+                    <a:ea typeface="Cambria Math" panose="02040503050406030204" pitchFamily="18" charset="0"/>
+                  </a:rPr>
+                  <a:t>- the first step can be performed in </a:t>
                 </a:r>
                 <a14:m>
                   <m:oMath xmlns:m="http://schemas.openxmlformats.org/officeDocument/2006/math">
-                    <m:r>
-                      <a:rPr lang="en-MY" sz="3200" b="0" i="1" smtClean="0">
-                        <a:latin typeface="Cambria Math" panose="02040503050406030204" pitchFamily="18" charset="0"/>
-                        <a:ea typeface="Cambria Math" panose="02040503050406030204" pitchFamily="18" charset="0"/>
-                      </a:rPr>
-                      <m:t>𝑓</m:t>
-                    </m:r>
-                    <m:r>
-                      <a:rPr lang="en-MY" sz="3200" b="0" i="1" smtClean="0">
-                        <a:latin typeface="Cambria Math" panose="02040503050406030204" pitchFamily="18" charset="0"/>
-                        <a:ea typeface="Cambria Math" panose="02040503050406030204" pitchFamily="18" charset="0"/>
-                      </a:rPr>
-                      <m:t> :</m:t>
-                    </m:r>
-                    <m:r>
-                      <a:rPr lang="en-MY" sz="3200" b="0" i="1" smtClean="0">
-                        <a:latin typeface="Cambria Math" panose="02040503050406030204" pitchFamily="18" charset="0"/>
-                        <a:ea typeface="Cambria Math" panose="02040503050406030204" pitchFamily="18" charset="0"/>
-                      </a:rPr>
-                      <m:t>𝑆</m:t>
-                    </m:r>
-                    <m:r>
-                      <a:rPr lang="en-MY" sz="3200" b="0" i="1" smtClean="0">
-                        <a:latin typeface="Cambria Math" panose="02040503050406030204" pitchFamily="18" charset="0"/>
-                        <a:ea typeface="Cambria Math" panose="02040503050406030204" pitchFamily="18" charset="0"/>
-                      </a:rPr>
-                      <m:t>→</m:t>
-                    </m:r>
-                    <m:r>
-                      <a:rPr lang="en-MY" sz="3200" b="0" i="1" smtClean="0">
-                        <a:latin typeface="Cambria Math" panose="02040503050406030204" pitchFamily="18" charset="0"/>
-                        <a:ea typeface="Cambria Math" panose="02040503050406030204" pitchFamily="18" charset="0"/>
-                      </a:rPr>
-                      <m:t>𝑇</m:t>
-                    </m:r>
+                    <m:sSub>
+                      <m:sSubPr>
+                        <m:ctrlPr>
+                          <a:rPr lang="en-MY" sz="3200" i="1" smtClean="0">
+                            <a:latin typeface="Cambria Math" panose="02040503050406030204" pitchFamily="18" charset="0"/>
+                            <a:ea typeface="Cambria Math" panose="02040503050406030204" pitchFamily="18" charset="0"/>
+                          </a:rPr>
+                        </m:ctrlPr>
+                      </m:sSubPr>
+                      <m:e>
+                        <m:r>
+                          <a:rPr lang="en-MY" sz="3200" b="0" i="1" smtClean="0">
+                            <a:latin typeface="Cambria Math" panose="02040503050406030204" pitchFamily="18" charset="0"/>
+                            <a:ea typeface="Cambria Math" panose="02040503050406030204" pitchFamily="18" charset="0"/>
+                          </a:rPr>
+                          <m:t>𝑛</m:t>
+                        </m:r>
+                      </m:e>
+                      <m:sub>
+                        <m:r>
+                          <a:rPr lang="en-MY" sz="3200" b="0" i="1" smtClean="0">
+                            <a:latin typeface="Cambria Math" panose="02040503050406030204" pitchFamily="18" charset="0"/>
+                            <a:ea typeface="Cambria Math" panose="02040503050406030204" pitchFamily="18" charset="0"/>
+                          </a:rPr>
+                          <m:t>1</m:t>
+                        </m:r>
+                      </m:sub>
+                    </m:sSub>
                   </m:oMath>
                 </a14:m>
+                <a:r>
+                  <a:rPr lang="en-MY" sz="3200" dirty="0"/>
+                  <a:t> ways</a:t>
+                </a:r>
+                <a:endParaRPr lang="en-MY" sz="3200" dirty="0">
+                  <a:ea typeface="Cambria Math" panose="02040503050406030204" pitchFamily="18" charset="0"/>
+                </a:endParaRPr>
+              </a:p>
+              <a:p>
+                <a:pPr marL="0" indent="0">
+                  <a:buNone/>
+                </a:pPr>
+                <a:r>
+                  <a:rPr lang="en-MY" sz="3200" dirty="0">
+                    <a:ea typeface="Cambria Math" panose="02040503050406030204" pitchFamily="18" charset="0"/>
+                  </a:rPr>
+                  <a:t>- the second step can be performed in </a:t>
+                </a:r>
+                <a14:m>
+                  <m:oMath xmlns:m="http://schemas.openxmlformats.org/officeDocument/2006/math">
+                    <m:sSub>
+                      <m:sSubPr>
+                        <m:ctrlPr>
+                          <a:rPr lang="en-MY" sz="3200" i="1">
+                            <a:latin typeface="Cambria Math" panose="02040503050406030204" pitchFamily="18" charset="0"/>
+                            <a:ea typeface="Cambria Math" panose="02040503050406030204" pitchFamily="18" charset="0"/>
+                          </a:rPr>
+                        </m:ctrlPr>
+                      </m:sSubPr>
+                      <m:e>
+                        <m:r>
+                          <a:rPr lang="en-MY" sz="3200" i="1">
+                            <a:latin typeface="Cambria Math" panose="02040503050406030204" pitchFamily="18" charset="0"/>
+                            <a:ea typeface="Cambria Math" panose="02040503050406030204" pitchFamily="18" charset="0"/>
+                          </a:rPr>
+                          <m:t>𝑛</m:t>
+                        </m:r>
+                      </m:e>
+                      <m:sub>
+                        <m:r>
+                          <a:rPr lang="en-MY" sz="3200" b="0" i="1" smtClean="0">
+                            <a:latin typeface="Cambria Math" panose="02040503050406030204" pitchFamily="18" charset="0"/>
+                            <a:ea typeface="Cambria Math" panose="02040503050406030204" pitchFamily="18" charset="0"/>
+                          </a:rPr>
+                          <m:t>2</m:t>
+                        </m:r>
+                      </m:sub>
+                    </m:sSub>
+                  </m:oMath>
+                </a14:m>
+                <a:r>
+                  <a:rPr lang="en-MY" sz="3200" dirty="0"/>
+                  <a:t> ways</a:t>
+                </a:r>
                 <a:endParaRPr lang="en-MY" sz="3200" dirty="0">
                   <a:ea typeface="Cambria Math" panose="02040503050406030204" pitchFamily="18" charset="0"/>
                 </a:endParaRPr>
@@ -4114,79 +4316,223 @@
                   <a:rPr lang="en-MY" sz="3200" dirty="0">
                     <a:ea typeface="Cambria Math" panose="02040503050406030204" pitchFamily="18" charset="0"/>
                   </a:rPr>
-                  <a:t> Injective: every value in T has </a:t>
+                  <a:t> the </a:t>
                 </a:r>
-                <a:r>
-                  <a:rPr lang="en-MY" sz="3200" i="1" dirty="0">
-                    <a:ea typeface="Cambria Math" panose="02040503050406030204" pitchFamily="18" charset="0"/>
-                  </a:rPr>
-                  <a:t>at most one</a:t>
-                </a:r>
+                <a14:m>
+                  <m:oMath xmlns:m="http://schemas.openxmlformats.org/officeDocument/2006/math">
+                    <m:sSup>
+                      <m:sSupPr>
+                        <m:ctrlPr>
+                          <a:rPr lang="en-MY" sz="3200" i="1" smtClean="0">
+                            <a:latin typeface="Cambria Math" panose="02040503050406030204" pitchFamily="18" charset="0"/>
+                            <a:ea typeface="Cambria Math" panose="02040503050406030204" pitchFamily="18" charset="0"/>
+                          </a:rPr>
+                        </m:ctrlPr>
+                      </m:sSupPr>
+                      <m:e>
+                        <m:r>
+                          <a:rPr lang="en-MY" sz="3200" b="0" i="1" smtClean="0">
+                            <a:latin typeface="Cambria Math" panose="02040503050406030204" pitchFamily="18" charset="0"/>
+                            <a:ea typeface="Cambria Math" panose="02040503050406030204" pitchFamily="18" charset="0"/>
+                          </a:rPr>
+                          <m:t>𝑘</m:t>
+                        </m:r>
+                      </m:e>
+                      <m:sup>
+                        <m:r>
+                          <a:rPr lang="en-MY" sz="3200" b="0" i="1" smtClean="0">
+                            <a:latin typeface="Cambria Math" panose="02040503050406030204" pitchFamily="18" charset="0"/>
+                            <a:ea typeface="Cambria Math" panose="02040503050406030204" pitchFamily="18" charset="0"/>
+                          </a:rPr>
+                          <m:t>𝑡h</m:t>
+                        </m:r>
+                      </m:sup>
+                    </m:sSup>
+                  </m:oMath>
+                </a14:m>
                 <a:r>
                   <a:rPr lang="en-MY" sz="3200" dirty="0">
                     <a:ea typeface="Cambria Math" panose="02040503050406030204" pitchFamily="18" charset="0"/>
                   </a:rPr>
-                  <a:t> value in S that maps to it.</a:t>
+                  <a:t> step can be performed in </a:t>
+                </a:r>
+                <a14:m>
+                  <m:oMath xmlns:m="http://schemas.openxmlformats.org/officeDocument/2006/math">
+                    <m:sSub>
+                      <m:sSubPr>
+                        <m:ctrlPr>
+                          <a:rPr lang="en-MY" sz="3200" i="1">
+                            <a:latin typeface="Cambria Math" panose="02040503050406030204" pitchFamily="18" charset="0"/>
+                            <a:ea typeface="Cambria Math" panose="02040503050406030204" pitchFamily="18" charset="0"/>
+                          </a:rPr>
+                        </m:ctrlPr>
+                      </m:sSubPr>
+                      <m:e>
+                        <m:r>
+                          <a:rPr lang="en-MY" sz="3200" i="1">
+                            <a:latin typeface="Cambria Math" panose="02040503050406030204" pitchFamily="18" charset="0"/>
+                            <a:ea typeface="Cambria Math" panose="02040503050406030204" pitchFamily="18" charset="0"/>
+                          </a:rPr>
+                          <m:t>𝑛</m:t>
+                        </m:r>
+                      </m:e>
+                      <m:sub>
+                        <m:r>
+                          <a:rPr lang="en-MY" sz="3200" b="0" i="1" smtClean="0">
+                            <a:latin typeface="Cambria Math" panose="02040503050406030204" pitchFamily="18" charset="0"/>
+                            <a:ea typeface="Cambria Math" panose="02040503050406030204" pitchFamily="18" charset="0"/>
+                          </a:rPr>
+                          <m:t>𝑘</m:t>
+                        </m:r>
+                      </m:sub>
+                    </m:sSub>
+                  </m:oMath>
+                </a14:m>
+                <a:r>
+                  <a:rPr lang="en-MY" sz="3200" dirty="0"/>
+                  <a:t> ways</a:t>
                 </a:r>
               </a:p>
               <a:p>
-                <a:pPr>
-                  <a:buFontTx/>
-                  <a:buChar char="-"/>
+                <a:pPr marL="0" indent="0">
+                  <a:buNone/>
                 </a:pPr>
                 <a:r>
-                  <a:rPr lang="en-MY" sz="3200" b="0" dirty="0">
-                    <a:ea typeface="Cambria Math" panose="02040503050406030204" pitchFamily="18" charset="0"/>
-                  </a:rPr>
-                  <a:t> Surjective: every v</a:t>
-                </a:r>
-                <a:r>
-                  <a:rPr lang="en-MY" sz="3200" dirty="0">
-                    <a:ea typeface="Cambria Math" panose="02040503050406030204" pitchFamily="18" charset="0"/>
-                  </a:rPr>
-                  <a:t>alue in T has </a:t>
-                </a:r>
-                <a:r>
-                  <a:rPr lang="en-MY" sz="3200" i="1" dirty="0">
-                    <a:ea typeface="Cambria Math" panose="02040503050406030204" pitchFamily="18" charset="0"/>
-                  </a:rPr>
-                  <a:t>at least one </a:t>
-                </a:r>
-                <a:r>
-                  <a:rPr lang="en-MY" sz="3200" dirty="0">
-                    <a:ea typeface="Cambria Math" panose="02040503050406030204" pitchFamily="18" charset="0"/>
-                  </a:rPr>
-                  <a:t>value in S that maps to it.</a:t>
+                  <a:rPr lang="en-MY" sz="3200" dirty="0"/>
+                  <a:t>Then the entire operation can be performed in</a:t>
                 </a:r>
               </a:p>
               <a:p>
-                <a:pPr>
-                  <a:buFontTx/>
-                  <a:buChar char="-"/>
+                <a:pPr marL="0" indent="0" algn="ctr">
+                  <a:buNone/>
                 </a:pPr>
                 <a:r>
-                  <a:rPr lang="en-MY" sz="3200" dirty="0">
-                    <a:ea typeface="Cambria Math" panose="02040503050406030204" pitchFamily="18" charset="0"/>
-                  </a:rPr>
-                  <a:t> Bijective: every value in T has </a:t>
+                  <a:rPr lang="en-MY" sz="3200" dirty="0"/>
+                  <a:t> </a:t>
                 </a:r>
+                <a14:m>
+                  <m:oMath xmlns:m="http://schemas.openxmlformats.org/officeDocument/2006/math">
+                    <m:sSub>
+                      <m:sSubPr>
+                        <m:ctrlPr>
+                          <a:rPr lang="en-MY" sz="3200" i="1">
+                            <a:latin typeface="Cambria Math" panose="02040503050406030204" pitchFamily="18" charset="0"/>
+                            <a:ea typeface="Cambria Math" panose="02040503050406030204" pitchFamily="18" charset="0"/>
+                          </a:rPr>
+                        </m:ctrlPr>
+                      </m:sSubPr>
+                      <m:e>
+                        <m:r>
+                          <a:rPr lang="en-MY" sz="3200" i="1">
+                            <a:latin typeface="Cambria Math" panose="02040503050406030204" pitchFamily="18" charset="0"/>
+                            <a:ea typeface="Cambria Math" panose="02040503050406030204" pitchFamily="18" charset="0"/>
+                          </a:rPr>
+                          <m:t>𝑛</m:t>
+                        </m:r>
+                      </m:e>
+                      <m:sub>
+                        <m:r>
+                          <a:rPr lang="en-MY" sz="3200" i="1">
+                            <a:latin typeface="Cambria Math" panose="02040503050406030204" pitchFamily="18" charset="0"/>
+                            <a:ea typeface="Cambria Math" panose="02040503050406030204" pitchFamily="18" charset="0"/>
+                          </a:rPr>
+                          <m:t>1</m:t>
+                        </m:r>
+                      </m:sub>
+                    </m:sSub>
+                    <m:r>
+                      <a:rPr lang="en-MY" sz="3200" b="0" i="1" smtClean="0">
+                        <a:latin typeface="Cambria Math" panose="02040503050406030204" pitchFamily="18" charset="0"/>
+                        <a:ea typeface="Cambria Math" panose="02040503050406030204" pitchFamily="18" charset="0"/>
+                      </a:rPr>
+                      <m:t>×</m:t>
+                    </m:r>
+                    <m:sSub>
+                      <m:sSubPr>
+                        <m:ctrlPr>
+                          <a:rPr lang="en-MY" sz="3200" i="1">
+                            <a:latin typeface="Cambria Math" panose="02040503050406030204" pitchFamily="18" charset="0"/>
+                            <a:ea typeface="Cambria Math" panose="02040503050406030204" pitchFamily="18" charset="0"/>
+                          </a:rPr>
+                        </m:ctrlPr>
+                      </m:sSubPr>
+                      <m:e>
+                        <m:r>
+                          <a:rPr lang="en-MY" sz="3200" i="1">
+                            <a:latin typeface="Cambria Math" panose="02040503050406030204" pitchFamily="18" charset="0"/>
+                            <a:ea typeface="Cambria Math" panose="02040503050406030204" pitchFamily="18" charset="0"/>
+                          </a:rPr>
+                          <m:t>𝑛</m:t>
+                        </m:r>
+                      </m:e>
+                      <m:sub>
+                        <m:r>
+                          <a:rPr lang="en-MY" sz="3200" b="0" i="1" smtClean="0">
+                            <a:latin typeface="Cambria Math" panose="02040503050406030204" pitchFamily="18" charset="0"/>
+                            <a:ea typeface="Cambria Math" panose="02040503050406030204" pitchFamily="18" charset="0"/>
+                          </a:rPr>
+                          <m:t>2</m:t>
+                        </m:r>
+                      </m:sub>
+                    </m:sSub>
+                    <m:r>
+                      <a:rPr lang="en-MY" sz="3200" b="0" i="1" smtClean="0">
+                        <a:latin typeface="Cambria Math" panose="02040503050406030204" pitchFamily="18" charset="0"/>
+                        <a:ea typeface="Cambria Math" panose="02040503050406030204" pitchFamily="18" charset="0"/>
+                      </a:rPr>
+                      <m:t>×…×</m:t>
+                    </m:r>
+                    <m:sSub>
+                      <m:sSubPr>
+                        <m:ctrlPr>
+                          <a:rPr lang="en-MY" sz="3200" i="1">
+                            <a:latin typeface="Cambria Math" panose="02040503050406030204" pitchFamily="18" charset="0"/>
+                            <a:ea typeface="Cambria Math" panose="02040503050406030204" pitchFamily="18" charset="0"/>
+                          </a:rPr>
+                        </m:ctrlPr>
+                      </m:sSubPr>
+                      <m:e>
+                        <m:r>
+                          <a:rPr lang="en-MY" sz="3200" i="1">
+                            <a:latin typeface="Cambria Math" panose="02040503050406030204" pitchFamily="18" charset="0"/>
+                            <a:ea typeface="Cambria Math" panose="02040503050406030204" pitchFamily="18" charset="0"/>
+                          </a:rPr>
+                          <m:t>𝑛</m:t>
+                        </m:r>
+                      </m:e>
+                      <m:sub>
+                        <m:r>
+                          <a:rPr lang="en-MY" sz="3200" b="0" i="1" smtClean="0">
+                            <a:latin typeface="Cambria Math" panose="02040503050406030204" pitchFamily="18" charset="0"/>
+                            <a:ea typeface="Cambria Math" panose="02040503050406030204" pitchFamily="18" charset="0"/>
+                          </a:rPr>
+                          <m:t>𝑘</m:t>
+                        </m:r>
+                      </m:sub>
+                    </m:sSub>
+                  </m:oMath>
+                </a14:m>
                 <a:r>
-                  <a:rPr lang="en-MY" sz="3200" i="1" dirty="0">
-                    <a:ea typeface="Cambria Math" panose="02040503050406030204" pitchFamily="18" charset="0"/>
-                  </a:rPr>
-                  <a:t>exactly one</a:t>
+                  <a:rPr lang="en-MY" sz="3200" dirty="0"/>
+                  <a:t> ways </a:t>
                 </a:r>
-                <a:r>
-                  <a:rPr lang="en-MY" sz="3200" dirty="0">
-                    <a:ea typeface="Cambria Math" panose="02040503050406030204" pitchFamily="18" charset="0"/>
-                  </a:rPr>
-                  <a:t> value in S that maps to it</a:t>
-                </a:r>
-                <a:endParaRPr lang="en-MY" sz="3200" b="0" dirty="0">
-                  <a:ea typeface="Cambria Math" panose="02040503050406030204" pitchFamily="18" charset="0"/>
-                </a:endParaRPr>
               </a:p>
               <a:p>
+                <a:pPr marL="0" indent="0">
+                  <a:buNone/>
+                </a:pPr>
+                <a:endParaRPr lang="en-MY" sz="3200" dirty="0"/>
+              </a:p>
+              <a:p>
+                <a:pPr marL="0" indent="0">
+                  <a:buNone/>
+                </a:pPr>
+                <a:endParaRPr lang="en-MY" sz="3200" dirty="0"/>
+              </a:p>
+              <a:p>
+                <a:pPr marL="0" indent="0">
+                  <a:buNone/>
+                </a:pPr>
                 <a:endParaRPr lang="en-MY" sz="3200" dirty="0"/>
               </a:p>
             </p:txBody>
@@ -4213,7 +4559,7 @@
               <a:blipFill>
                 <a:blip r:embed="rId2"/>
                 <a:stretch>
-                  <a:fillRect l="-2485" t="-3030"/>
+                  <a:fillRect l="-2485" t="-3182"/>
                 </a:stretch>
               </a:blipFill>
             </p:spPr>
@@ -4235,7 +4581,7 @@
     </p:spTree>
     <p:extLst>
       <p:ext uri="{BB962C8B-B14F-4D97-AF65-F5344CB8AC3E}">
-        <p14:creationId xmlns:p14="http://schemas.microsoft.com/office/powerpoint/2010/main" val="713865108"/>
+        <p14:creationId xmlns:p14="http://schemas.microsoft.com/office/powerpoint/2010/main" val="3741664243"/>
       </p:ext>
     </p:extLst>
   </p:cSld>
@@ -4245,7 +4591,7 @@
 </p:sld>
 </file>
 
-<file path=ppt/slides/slide4.xml><?xml version="1.0" encoding="utf-8"?>
+<file path=ppt/slides/slide5.xml><?xml version="1.0" encoding="utf-8"?>
 <p:sld xmlns:a="http://schemas.openxmlformats.org/drawingml/2006/main" xmlns:r="http://schemas.openxmlformats.org/officeDocument/2006/relationships" xmlns:p="http://schemas.openxmlformats.org/presentationml/2006/main">
   <p:cSld>
     <p:spTree>
@@ -4285,7 +4631,7 @@
           <a:p>
             <a:r>
               <a:rPr lang="en-MY" dirty="0"/>
-              <a:t>Composition</a:t>
+              <a:t>Permutations</a:t>
             </a:r>
           </a:p>
         </p:txBody>
@@ -4322,115 +4668,16 @@
                   <a:rPr lang="en-MY" sz="3200" dirty="0">
                     <a:ea typeface="Cambria Math" panose="02040503050406030204" pitchFamily="18" charset="0"/>
                   </a:rPr>
-                  <a:t>We can easily compose functions together.</a:t>
+                  <a:t>A permutation of a set of objects is an ordering of the objects in a row.</a:t>
                 </a:r>
               </a:p>
               <a:p>
                 <a:pPr marL="0" indent="0">
                   <a:buNone/>
                 </a:pPr>
-                <a:r>
-                  <a:rPr lang="en-MY" sz="3200" dirty="0">
-                    <a:ea typeface="Cambria Math" panose="02040503050406030204" pitchFamily="18" charset="0"/>
-                  </a:rPr>
-                  <a:t>T</a:t>
-                </a:r>
-                <a:r>
-                  <a:rPr lang="en-MY" sz="3200" b="0" dirty="0">
-                    <a:ea typeface="Cambria Math" panose="02040503050406030204" pitchFamily="18" charset="0"/>
-                  </a:rPr>
-                  <a:t>he composition of two functions </a:t>
-                </a:r>
-                <a14:m>
-                  <m:oMath xmlns:m="http://schemas.openxmlformats.org/officeDocument/2006/math">
-                    <m:r>
-                      <a:rPr lang="en-MY" sz="3200" b="0" i="1" smtClean="0">
-                        <a:latin typeface="Cambria Math" panose="02040503050406030204" pitchFamily="18" charset="0"/>
-                        <a:ea typeface="Cambria Math" panose="02040503050406030204" pitchFamily="18" charset="0"/>
-                      </a:rPr>
-                      <m:t>𝑓</m:t>
-                    </m:r>
-                    <m:r>
-                      <a:rPr lang="en-MY" sz="3200" b="0" i="1" smtClean="0">
-                        <a:latin typeface="Cambria Math" panose="02040503050406030204" pitchFamily="18" charset="0"/>
-                        <a:ea typeface="Cambria Math" panose="02040503050406030204" pitchFamily="18" charset="0"/>
-                      </a:rPr>
-                      <m:t> :</m:t>
-                    </m:r>
-                    <m:r>
-                      <a:rPr lang="en-MY" sz="3200" b="0" i="1" smtClean="0">
-                        <a:latin typeface="Cambria Math" panose="02040503050406030204" pitchFamily="18" charset="0"/>
-                        <a:ea typeface="Cambria Math" panose="02040503050406030204" pitchFamily="18" charset="0"/>
-                      </a:rPr>
-                      <m:t>𝑆</m:t>
-                    </m:r>
-                    <m:r>
-                      <a:rPr lang="en-MY" sz="3200" b="0" i="1" smtClean="0">
-                        <a:latin typeface="Cambria Math" panose="02040503050406030204" pitchFamily="18" charset="0"/>
-                        <a:ea typeface="Cambria Math" panose="02040503050406030204" pitchFamily="18" charset="0"/>
-                      </a:rPr>
-                      <m:t>→</m:t>
-                    </m:r>
-                    <m:r>
-                      <a:rPr lang="en-MY" sz="3200" b="0" i="1" smtClean="0">
-                        <a:latin typeface="Cambria Math" panose="02040503050406030204" pitchFamily="18" charset="0"/>
-                        <a:ea typeface="Cambria Math" panose="02040503050406030204" pitchFamily="18" charset="0"/>
-                      </a:rPr>
-                      <m:t>𝑇</m:t>
-                    </m:r>
-                  </m:oMath>
-                </a14:m>
-                <a:r>
-                  <a:rPr lang="en-MY" sz="3200" b="0" dirty="0">
-                    <a:ea typeface="Cambria Math" panose="02040503050406030204" pitchFamily="18" charset="0"/>
-                  </a:rPr>
-                  <a:t> and </a:t>
-                </a:r>
-                <a14:m>
-                  <m:oMath xmlns:m="http://schemas.openxmlformats.org/officeDocument/2006/math">
-                    <m:r>
-                      <a:rPr lang="en-MY" sz="3200" b="0" i="1" smtClean="0">
-                        <a:latin typeface="Cambria Math" panose="02040503050406030204" pitchFamily="18" charset="0"/>
-                        <a:ea typeface="Cambria Math" panose="02040503050406030204" pitchFamily="18" charset="0"/>
-                      </a:rPr>
-                      <m:t>𝑔</m:t>
-                    </m:r>
-                    <m:r>
-                      <a:rPr lang="en-MY" sz="3200" b="0" i="1" smtClean="0">
-                        <a:latin typeface="Cambria Math" panose="02040503050406030204" pitchFamily="18" charset="0"/>
-                        <a:ea typeface="Cambria Math" panose="02040503050406030204" pitchFamily="18" charset="0"/>
-                      </a:rPr>
-                      <m:t> :</m:t>
-                    </m:r>
-                    <m:r>
-                      <a:rPr lang="en-MY" sz="3200" b="0" i="1" smtClean="0">
-                        <a:latin typeface="Cambria Math" panose="02040503050406030204" pitchFamily="18" charset="0"/>
-                        <a:ea typeface="Cambria Math" panose="02040503050406030204" pitchFamily="18" charset="0"/>
-                      </a:rPr>
-                      <m:t>𝑇</m:t>
-                    </m:r>
-                    <m:r>
-                      <a:rPr lang="en-MY" sz="3200" b="0" i="1" smtClean="0">
-                        <a:latin typeface="Cambria Math" panose="02040503050406030204" pitchFamily="18" charset="0"/>
-                        <a:ea typeface="Cambria Math" panose="02040503050406030204" pitchFamily="18" charset="0"/>
-                      </a:rPr>
-                      <m:t>→</m:t>
-                    </m:r>
-                    <m:r>
-                      <a:rPr lang="en-MY" sz="3200" b="0" i="1" smtClean="0">
-                        <a:latin typeface="Cambria Math" panose="02040503050406030204" pitchFamily="18" charset="0"/>
-                        <a:ea typeface="Cambria Math" panose="02040503050406030204" pitchFamily="18" charset="0"/>
-                      </a:rPr>
-                      <m:t>𝑈</m:t>
-                    </m:r>
-                  </m:oMath>
-                </a14:m>
-                <a:r>
-                  <a:rPr lang="en-MY" sz="3200" b="0" dirty="0">
-                    <a:ea typeface="Cambria Math" panose="02040503050406030204" pitchFamily="18" charset="0"/>
-                  </a:rPr>
-                  <a:t> is denoted as: </a:t>
-                </a:r>
+                <a:endParaRPr lang="en-MY" sz="3200" dirty="0">
+                  <a:ea typeface="Cambria Math" panose="02040503050406030204" pitchFamily="18" charset="0"/>
+                </a:endParaRPr>
               </a:p>
               <a:p>
                 <a:pPr marL="0" indent="0">
@@ -4445,36 +4692,220 @@
                       <m:r>
                         <a:rPr lang="en-MY" sz="3200" b="0" i="1" smtClean="0">
                           <a:latin typeface="Cambria Math" panose="02040503050406030204" pitchFamily="18" charset="0"/>
-                          <a:ea typeface="Cambria Math" panose="02040503050406030204" pitchFamily="18" charset="0"/>
                         </a:rPr>
-                        <m:t>𝑔</m:t>
+                        <m:t>𝑃</m:t>
+                      </m:r>
+                      <m:d>
+                        <m:dPr>
+                          <m:ctrlPr>
+                            <a:rPr lang="en-MY" sz="3200" b="0" i="1" smtClean="0">
+                              <a:latin typeface="Cambria Math" panose="02040503050406030204" pitchFamily="18" charset="0"/>
+                            </a:rPr>
+                          </m:ctrlPr>
+                        </m:dPr>
+                        <m:e>
+                          <m:r>
+                            <a:rPr lang="en-MY" sz="3200" b="0" i="1" smtClean="0">
+                              <a:latin typeface="Cambria Math" panose="02040503050406030204" pitchFamily="18" charset="0"/>
+                            </a:rPr>
+                            <m:t>𝑛</m:t>
+                          </m:r>
+                          <m:r>
+                            <a:rPr lang="en-MY" sz="3200" b="0" i="1" smtClean="0">
+                              <a:latin typeface="Cambria Math" panose="02040503050406030204" pitchFamily="18" charset="0"/>
+                            </a:rPr>
+                            <m:t>,</m:t>
+                          </m:r>
+                          <m:r>
+                            <a:rPr lang="en-MY" sz="3200" b="0" i="1" smtClean="0">
+                              <a:latin typeface="Cambria Math" panose="02040503050406030204" pitchFamily="18" charset="0"/>
+                            </a:rPr>
+                            <m:t>𝑟</m:t>
+                          </m:r>
+                        </m:e>
+                      </m:d>
+                      <m:r>
+                        <a:rPr lang="en-MY" sz="3200" b="0" i="1" smtClean="0">
+                          <a:latin typeface="Cambria Math" panose="02040503050406030204" pitchFamily="18" charset="0"/>
+                        </a:rPr>
+                        <m:t>=</m:t>
                       </m:r>
                       <m:r>
                         <a:rPr lang="en-MY" sz="3200" b="0" i="1" smtClean="0">
                           <a:latin typeface="Cambria Math" panose="02040503050406030204" pitchFamily="18" charset="0"/>
-                          <a:ea typeface="Cambria Math" panose="02040503050406030204" pitchFamily="18" charset="0"/>
                         </a:rPr>
-                        <m:t>∘</m:t>
+                        <m:t>𝑛</m:t>
                       </m:r>
                       <m:r>
                         <a:rPr lang="en-MY" sz="3200" b="0" i="1" smtClean="0">
                           <a:latin typeface="Cambria Math" panose="02040503050406030204" pitchFamily="18" charset="0"/>
-                          <a:ea typeface="Cambria Math" panose="02040503050406030204" pitchFamily="18" charset="0"/>
                         </a:rPr>
-                        <m:t>𝑓</m:t>
+                        <m:t>×</m:t>
                       </m:r>
+                      <m:d>
+                        <m:dPr>
+                          <m:ctrlPr>
+                            <a:rPr lang="en-MY" sz="3200" b="0" i="1" smtClean="0">
+                              <a:latin typeface="Cambria Math" panose="02040503050406030204" pitchFamily="18" charset="0"/>
+                            </a:rPr>
+                          </m:ctrlPr>
+                        </m:dPr>
+                        <m:e>
+                          <m:r>
+                            <a:rPr lang="en-MY" sz="3200" b="0" i="1" smtClean="0">
+                              <a:latin typeface="Cambria Math" panose="02040503050406030204" pitchFamily="18" charset="0"/>
+                            </a:rPr>
+                            <m:t>𝑛</m:t>
+                          </m:r>
+                          <m:r>
+                            <a:rPr lang="en-MY" sz="3200" b="0" i="1" smtClean="0">
+                              <a:latin typeface="Cambria Math" panose="02040503050406030204" pitchFamily="18" charset="0"/>
+                            </a:rPr>
+                            <m:t>−1</m:t>
+                          </m:r>
+                        </m:e>
+                      </m:d>
+                      <m:r>
+                        <a:rPr lang="en-MY" sz="3200" b="0" i="1" smtClean="0">
+                          <a:latin typeface="Cambria Math" panose="02040503050406030204" pitchFamily="18" charset="0"/>
+                        </a:rPr>
+                        <m:t>×…×</m:t>
+                      </m:r>
+                      <m:d>
+                        <m:dPr>
+                          <m:ctrlPr>
+                            <a:rPr lang="en-MY" sz="3200" b="0" i="1" smtClean="0">
+                              <a:latin typeface="Cambria Math" panose="02040503050406030204" pitchFamily="18" charset="0"/>
+                            </a:rPr>
+                          </m:ctrlPr>
+                        </m:dPr>
+                        <m:e>
+                          <m:r>
+                            <a:rPr lang="en-MY" sz="3200" b="0" i="1" smtClean="0">
+                              <a:latin typeface="Cambria Math" panose="02040503050406030204" pitchFamily="18" charset="0"/>
+                            </a:rPr>
+                            <m:t>𝑛</m:t>
+                          </m:r>
+                          <m:r>
+                            <a:rPr lang="en-MY" sz="3200" b="0" i="1" smtClean="0">
+                              <a:latin typeface="Cambria Math" panose="02040503050406030204" pitchFamily="18" charset="0"/>
+                            </a:rPr>
+                            <m:t>−</m:t>
+                          </m:r>
+                          <m:r>
+                            <a:rPr lang="en-MY" sz="3200" b="0" i="1" smtClean="0">
+                              <a:latin typeface="Cambria Math" panose="02040503050406030204" pitchFamily="18" charset="0"/>
+                            </a:rPr>
+                            <m:t>𝑟</m:t>
+                          </m:r>
+                          <m:r>
+                            <a:rPr lang="en-MY" sz="3200" b="0" i="1" smtClean="0">
+                              <a:latin typeface="Cambria Math" panose="02040503050406030204" pitchFamily="18" charset="0"/>
+                            </a:rPr>
+                            <m:t>+1</m:t>
+                          </m:r>
+                        </m:e>
+                      </m:d>
+                      <m:r>
+                        <a:rPr lang="en-MY" sz="3200" b="0" i="1" smtClean="0">
+                          <a:latin typeface="Cambria Math" panose="02040503050406030204" pitchFamily="18" charset="0"/>
+                        </a:rPr>
+                        <m:t>= </m:t>
+                      </m:r>
+                      <m:f>
+                        <m:fPr>
+                          <m:ctrlPr>
+                            <a:rPr lang="en-MY" sz="3200" b="0" i="1" smtClean="0">
+                              <a:latin typeface="Cambria Math" panose="02040503050406030204" pitchFamily="18" charset="0"/>
+                            </a:rPr>
+                          </m:ctrlPr>
+                        </m:fPr>
+                        <m:num>
+                          <m:r>
+                            <a:rPr lang="en-MY" sz="3200" b="0" i="1" smtClean="0">
+                              <a:latin typeface="Cambria Math" panose="02040503050406030204" pitchFamily="18" charset="0"/>
+                            </a:rPr>
+                            <m:t> </m:t>
+                          </m:r>
+                          <m:r>
+                            <a:rPr lang="en-MY" sz="3200" b="0" i="1" smtClean="0">
+                              <a:latin typeface="Cambria Math" panose="02040503050406030204" pitchFamily="18" charset="0"/>
+                            </a:rPr>
+                            <m:t>𝑛</m:t>
+                          </m:r>
+                          <m:r>
+                            <a:rPr lang="en-MY" sz="3200" b="0" i="1" smtClean="0">
+                              <a:latin typeface="Cambria Math" panose="02040503050406030204" pitchFamily="18" charset="0"/>
+                            </a:rPr>
+                            <m:t>!</m:t>
+                          </m:r>
+                        </m:num>
+                        <m:den>
+                          <m:d>
+                            <m:dPr>
+                              <m:ctrlPr>
+                                <a:rPr lang="en-MY" sz="3200" b="0" i="1" smtClean="0">
+                                  <a:latin typeface="Cambria Math" panose="02040503050406030204" pitchFamily="18" charset="0"/>
+                                </a:rPr>
+                              </m:ctrlPr>
+                            </m:dPr>
+                            <m:e>
+                              <m:r>
+                                <a:rPr lang="en-MY" sz="3200" b="0" i="1" smtClean="0">
+                                  <a:latin typeface="Cambria Math" panose="02040503050406030204" pitchFamily="18" charset="0"/>
+                                </a:rPr>
+                                <m:t>𝑛</m:t>
+                              </m:r>
+                              <m:r>
+                                <a:rPr lang="en-MY" sz="3200" b="0" i="1" smtClean="0">
+                                  <a:latin typeface="Cambria Math" panose="02040503050406030204" pitchFamily="18" charset="0"/>
+                                </a:rPr>
+                                <m:t>−</m:t>
+                              </m:r>
+                              <m:r>
+                                <a:rPr lang="en-MY" sz="3200" b="0" i="1" smtClean="0">
+                                  <a:latin typeface="Cambria Math" panose="02040503050406030204" pitchFamily="18" charset="0"/>
+                                </a:rPr>
+                                <m:t>𝑟</m:t>
+                              </m:r>
+                            </m:e>
+                          </m:d>
+                          <m:r>
+                            <a:rPr lang="en-MY" sz="3200" b="0" i="1" smtClean="0">
+                              <a:latin typeface="Cambria Math" panose="02040503050406030204" pitchFamily="18" charset="0"/>
+                            </a:rPr>
+                            <m:t>!</m:t>
+                          </m:r>
+                        </m:den>
+                      </m:f>
                     </m:oMath>
                   </m:oMathPara>
                 </a14:m>
-                <a:endParaRPr lang="en-MY" sz="3200" b="0" dirty="0">
-                  <a:ea typeface="Cambria Math" panose="02040503050406030204" pitchFamily="18" charset="0"/>
-                </a:endParaRPr>
+                <a:endParaRPr lang="en-MY" sz="3200" b="0" dirty="0"/>
               </a:p>
               <a:p>
-                <a:r>
-                  <a:rPr lang="en-MY" sz="3200" dirty="0"/>
-                  <a:t>and it is a function from S to U.</a:t>
-                </a:r>
+                <a:pPr marL="0" indent="0">
+                  <a:buNone/>
+                </a:pPr>
+                <a:endParaRPr lang="en-MY" sz="3200" dirty="0"/>
+              </a:p>
+              <a:p>
+                <a:pPr marL="0" indent="0">
+                  <a:buNone/>
+                </a:pPr>
+                <a:endParaRPr lang="en-MY" sz="3200" dirty="0"/>
+              </a:p>
+              <a:p>
+                <a:pPr marL="0" indent="0">
+                  <a:buNone/>
+                </a:pPr>
+                <a:endParaRPr lang="en-MY" sz="3200" dirty="0"/>
+              </a:p>
+              <a:p>
+                <a:pPr marL="0" indent="0">
+                  <a:buNone/>
+                </a:pPr>
+                <a:endParaRPr lang="en-MY" sz="3200" dirty="0"/>
               </a:p>
             </p:txBody>
           </p:sp>
@@ -4522,7 +4953,1024 @@
     </p:spTree>
     <p:extLst>
       <p:ext uri="{BB962C8B-B14F-4D97-AF65-F5344CB8AC3E}">
-        <p14:creationId xmlns:p14="http://schemas.microsoft.com/office/powerpoint/2010/main" val="3741664243"/>
+        <p14:creationId xmlns:p14="http://schemas.microsoft.com/office/powerpoint/2010/main" val="2037616769"/>
+      </p:ext>
+    </p:extLst>
+  </p:cSld>
+  <p:clrMapOvr>
+    <a:masterClrMapping/>
+  </p:clrMapOvr>
+</p:sld>
+</file>
+
+<file path=ppt/slides/slide6.xml><?xml version="1.0" encoding="utf-8"?>
+<p:sld xmlns:a="http://schemas.openxmlformats.org/drawingml/2006/main" xmlns:r="http://schemas.openxmlformats.org/officeDocument/2006/relationships" xmlns:p="http://schemas.openxmlformats.org/presentationml/2006/main">
+  <p:cSld>
+    <p:spTree>
+      <p:nvGrpSpPr>
+        <p:cNvPr id="1" name=""/>
+        <p:cNvGrpSpPr/>
+        <p:nvPr/>
+      </p:nvGrpSpPr>
+      <p:grpSpPr>
+        <a:xfrm>
+          <a:off x="0" y="0"/>
+          <a:ext cx="0" cy="0"/>
+          <a:chOff x="0" y="0"/>
+          <a:chExt cx="0" cy="0"/>
+        </a:xfrm>
+      </p:grpSpPr>
+      <p:sp>
+        <p:nvSpPr>
+          <p:cNvPr id="2" name="Title 1">
+            <a:extLst>
+              <a:ext uri="{FF2B5EF4-FFF2-40B4-BE49-F238E27FC236}">
+                <a16:creationId xmlns:a16="http://schemas.microsoft.com/office/drawing/2014/main" id="{2B3B7CF7-821D-432B-AB6B-521D80545732}"/>
+              </a:ext>
+            </a:extLst>
+          </p:cNvPr>
+          <p:cNvSpPr>
+            <a:spLocks noGrp="1"/>
+          </p:cNvSpPr>
+          <p:nvPr>
+            <p:ph type="title"/>
+          </p:nvPr>
+        </p:nvSpPr>
+        <p:spPr/>
+        <p:txBody>
+          <a:bodyPr/>
+          <a:lstStyle/>
+          <a:p>
+            <a:r>
+              <a:rPr lang="en-MY" dirty="0"/>
+              <a:t>Counting elements of disjoint sets</a:t>
+            </a:r>
+          </a:p>
+        </p:txBody>
+      </p:sp>
+      <p:sp>
+        <p:nvSpPr>
+          <p:cNvPr id="3" name="Content Placeholder 2">
+            <a:extLst>
+              <a:ext uri="{FF2B5EF4-FFF2-40B4-BE49-F238E27FC236}">
+                <a16:creationId xmlns:a16="http://schemas.microsoft.com/office/drawing/2014/main" id="{7A200C48-F6E6-438D-8B6C-3933FFD4DEBF}"/>
+              </a:ext>
+            </a:extLst>
+          </p:cNvPr>
+          <p:cNvSpPr>
+            <a:spLocks noGrp="1"/>
+          </p:cNvSpPr>
+          <p:nvPr>
+            <p:ph idx="1"/>
+          </p:nvPr>
+        </p:nvSpPr>
+        <p:spPr/>
+        <p:txBody>
+          <a:bodyPr>
+            <a:normAutofit/>
+          </a:bodyPr>
+          <a:lstStyle/>
+          <a:p>
+            <a:pPr marL="0" indent="0">
+              <a:buNone/>
+            </a:pPr>
+            <a:r>
+              <a:rPr lang="en-MY" sz="3200" b="0" dirty="0">
+                <a:ea typeface="Cambria Math" panose="02040503050406030204" pitchFamily="18" charset="0"/>
+              </a:rPr>
+              <a:t>Addition rule: the number of elements in a union of mutually disjoint finite sets = the sum of the number of elements in the component sets</a:t>
+            </a:r>
+          </a:p>
+          <a:p>
+            <a:pPr marL="0" indent="0">
+              <a:buNone/>
+            </a:pPr>
+            <a:endParaRPr lang="en-MY" sz="3200" b="0" dirty="0">
+              <a:ea typeface="Cambria Math" panose="02040503050406030204" pitchFamily="18" charset="0"/>
+            </a:endParaRPr>
+          </a:p>
+          <a:p>
+            <a:pPr marL="0" indent="0">
+              <a:buNone/>
+            </a:pPr>
+            <a:endParaRPr lang="en-MY" sz="3200" b="0" dirty="0"/>
+          </a:p>
+          <a:p>
+            <a:pPr marL="0" indent="0">
+              <a:buNone/>
+            </a:pPr>
+            <a:endParaRPr lang="en-MY" sz="3200" dirty="0"/>
+          </a:p>
+          <a:p>
+            <a:pPr marL="0" indent="0">
+              <a:buNone/>
+            </a:pPr>
+            <a:endParaRPr lang="en-MY" sz="3200" dirty="0"/>
+          </a:p>
+          <a:p>
+            <a:pPr marL="0" indent="0">
+              <a:buNone/>
+            </a:pPr>
+            <a:endParaRPr lang="en-MY" sz="3200" dirty="0"/>
+          </a:p>
+          <a:p>
+            <a:pPr marL="0" indent="0">
+              <a:buNone/>
+            </a:pPr>
+            <a:endParaRPr lang="en-MY" sz="3200" dirty="0"/>
+          </a:p>
+        </p:txBody>
+      </p:sp>
+    </p:spTree>
+    <p:extLst>
+      <p:ext uri="{BB962C8B-B14F-4D97-AF65-F5344CB8AC3E}">
+        <p14:creationId xmlns:p14="http://schemas.microsoft.com/office/powerpoint/2010/main" val="2368853703"/>
+      </p:ext>
+    </p:extLst>
+  </p:cSld>
+  <p:clrMapOvr>
+    <a:masterClrMapping/>
+  </p:clrMapOvr>
+</p:sld>
+</file>
+
+<file path=ppt/slides/slide7.xml><?xml version="1.0" encoding="utf-8"?>
+<p:sld xmlns:a="http://schemas.openxmlformats.org/drawingml/2006/main" xmlns:r="http://schemas.openxmlformats.org/officeDocument/2006/relationships" xmlns:p="http://schemas.openxmlformats.org/presentationml/2006/main">
+  <p:cSld>
+    <p:spTree>
+      <p:nvGrpSpPr>
+        <p:cNvPr id="1" name=""/>
+        <p:cNvGrpSpPr/>
+        <p:nvPr/>
+      </p:nvGrpSpPr>
+      <p:grpSpPr>
+        <a:xfrm>
+          <a:off x="0" y="0"/>
+          <a:ext cx="0" cy="0"/>
+          <a:chOff x="0" y="0"/>
+          <a:chExt cx="0" cy="0"/>
+        </a:xfrm>
+      </p:grpSpPr>
+      <p:sp>
+        <p:nvSpPr>
+          <p:cNvPr id="2" name="Title 1">
+            <a:extLst>
+              <a:ext uri="{FF2B5EF4-FFF2-40B4-BE49-F238E27FC236}">
+                <a16:creationId xmlns:a16="http://schemas.microsoft.com/office/drawing/2014/main" id="{2B3B7CF7-821D-432B-AB6B-521D80545732}"/>
+              </a:ext>
+            </a:extLst>
+          </p:cNvPr>
+          <p:cNvSpPr>
+            <a:spLocks noGrp="1"/>
+          </p:cNvSpPr>
+          <p:nvPr>
+            <p:ph type="title"/>
+          </p:nvPr>
+        </p:nvSpPr>
+        <p:spPr/>
+        <p:txBody>
+          <a:bodyPr/>
+          <a:lstStyle/>
+          <a:p>
+            <a:r>
+              <a:rPr lang="en-MY" dirty="0"/>
+              <a:t>Inclusion/Exclusion rule</a:t>
+            </a:r>
+          </a:p>
+        </p:txBody>
+      </p:sp>
+      <mc:AlternateContent xmlns:mc="http://schemas.openxmlformats.org/markup-compatibility/2006">
+        <mc:Choice xmlns:a14="http://schemas.microsoft.com/office/drawing/2010/main" Requires="a14">
+          <p:sp>
+            <p:nvSpPr>
+              <p:cNvPr id="3" name="Content Placeholder 2">
+                <a:extLst>
+                  <a:ext uri="{FF2B5EF4-FFF2-40B4-BE49-F238E27FC236}">
+                    <a16:creationId xmlns:a16="http://schemas.microsoft.com/office/drawing/2014/main" id="{7A200C48-F6E6-438D-8B6C-3933FFD4DEBF}"/>
+                  </a:ext>
+                </a:extLst>
+              </p:cNvPr>
+              <p:cNvSpPr>
+                <a:spLocks noGrp="1"/>
+              </p:cNvSpPr>
+              <p:nvPr>
+                <p:ph idx="1"/>
+              </p:nvPr>
+            </p:nvSpPr>
+            <p:spPr/>
+            <p:txBody>
+              <a:bodyPr>
+                <a:normAutofit fontScale="85000" lnSpcReduction="10000"/>
+              </a:bodyPr>
+              <a:lstStyle/>
+              <a:p>
+                <a:pPr marL="0" indent="0">
+                  <a:buNone/>
+                </a:pPr>
+                <a:r>
+                  <a:rPr lang="en-MY" sz="3200" dirty="0">
+                    <a:ea typeface="Cambria Math" panose="02040503050406030204" pitchFamily="18" charset="0"/>
+                  </a:rPr>
+                  <a:t>Generalized addition rule (applicable to sets that are not disjoint)</a:t>
+                </a:r>
+              </a:p>
+              <a:p>
+                <a:pPr marL="0" indent="0">
+                  <a:buNone/>
+                </a:pPr>
+                <a14:m>
+                  <m:oMathPara xmlns:m="http://schemas.openxmlformats.org/officeDocument/2006/math">
+                    <m:oMathParaPr>
+                      <m:jc m:val="centerGroup"/>
+                    </m:oMathParaPr>
+                    <m:oMath xmlns:m="http://schemas.openxmlformats.org/officeDocument/2006/math">
+                      <m:r>
+                        <a:rPr lang="en-MY" sz="3200" b="0" i="1" smtClean="0">
+                          <a:latin typeface="Cambria Math" panose="02040503050406030204" pitchFamily="18" charset="0"/>
+                          <a:ea typeface="Cambria Math" panose="02040503050406030204" pitchFamily="18" charset="0"/>
+                        </a:rPr>
+                        <m:t>𝑁</m:t>
+                      </m:r>
+                      <m:d>
+                        <m:dPr>
+                          <m:ctrlPr>
+                            <a:rPr lang="en-MY" sz="3200" b="0" i="1" smtClean="0">
+                              <a:latin typeface="Cambria Math" panose="02040503050406030204" pitchFamily="18" charset="0"/>
+                              <a:ea typeface="Cambria Math" panose="02040503050406030204" pitchFamily="18" charset="0"/>
+                            </a:rPr>
+                          </m:ctrlPr>
+                        </m:dPr>
+                        <m:e>
+                          <m:r>
+                            <a:rPr lang="en-MY" sz="3200" b="0" i="1" smtClean="0">
+                              <a:latin typeface="Cambria Math" panose="02040503050406030204" pitchFamily="18" charset="0"/>
+                              <a:ea typeface="Cambria Math" panose="02040503050406030204" pitchFamily="18" charset="0"/>
+                            </a:rPr>
+                            <m:t>𝐴</m:t>
+                          </m:r>
+                          <m:r>
+                            <a:rPr lang="en-MY" sz="3200" b="0" i="1" smtClean="0">
+                              <a:latin typeface="Cambria Math" panose="02040503050406030204" pitchFamily="18" charset="0"/>
+                              <a:ea typeface="Cambria Math" panose="02040503050406030204" pitchFamily="18" charset="0"/>
+                            </a:rPr>
+                            <m:t>∪</m:t>
+                          </m:r>
+                          <m:r>
+                            <a:rPr lang="en-MY" sz="3200" b="0" i="1" smtClean="0">
+                              <a:latin typeface="Cambria Math" panose="02040503050406030204" pitchFamily="18" charset="0"/>
+                              <a:ea typeface="Cambria Math" panose="02040503050406030204" pitchFamily="18" charset="0"/>
+                            </a:rPr>
+                            <m:t>𝐵</m:t>
+                          </m:r>
+                        </m:e>
+                      </m:d>
+                      <m:r>
+                        <a:rPr lang="en-MY" sz="3200" b="0" i="1" smtClean="0">
+                          <a:latin typeface="Cambria Math" panose="02040503050406030204" pitchFamily="18" charset="0"/>
+                          <a:ea typeface="Cambria Math" panose="02040503050406030204" pitchFamily="18" charset="0"/>
+                        </a:rPr>
+                        <m:t>=</m:t>
+                      </m:r>
+                      <m:r>
+                        <a:rPr lang="en-MY" sz="3200" b="0" i="1" smtClean="0">
+                          <a:latin typeface="Cambria Math" panose="02040503050406030204" pitchFamily="18" charset="0"/>
+                          <a:ea typeface="Cambria Math" panose="02040503050406030204" pitchFamily="18" charset="0"/>
+                        </a:rPr>
+                        <m:t>𝑁</m:t>
+                      </m:r>
+                      <m:d>
+                        <m:dPr>
+                          <m:ctrlPr>
+                            <a:rPr lang="en-MY" sz="3200" b="0" i="1" smtClean="0">
+                              <a:latin typeface="Cambria Math" panose="02040503050406030204" pitchFamily="18" charset="0"/>
+                              <a:ea typeface="Cambria Math" panose="02040503050406030204" pitchFamily="18" charset="0"/>
+                            </a:rPr>
+                          </m:ctrlPr>
+                        </m:dPr>
+                        <m:e>
+                          <m:r>
+                            <a:rPr lang="en-MY" sz="3200" b="0" i="1" smtClean="0">
+                              <a:latin typeface="Cambria Math" panose="02040503050406030204" pitchFamily="18" charset="0"/>
+                              <a:ea typeface="Cambria Math" panose="02040503050406030204" pitchFamily="18" charset="0"/>
+                            </a:rPr>
+                            <m:t>𝐴</m:t>
+                          </m:r>
+                        </m:e>
+                      </m:d>
+                      <m:r>
+                        <a:rPr lang="en-MY" sz="3200" b="0" i="1" smtClean="0">
+                          <a:latin typeface="Cambria Math" panose="02040503050406030204" pitchFamily="18" charset="0"/>
+                          <a:ea typeface="Cambria Math" panose="02040503050406030204" pitchFamily="18" charset="0"/>
+                        </a:rPr>
+                        <m:t>+</m:t>
+                      </m:r>
+                      <m:r>
+                        <a:rPr lang="en-MY" sz="3200" b="0" i="1" smtClean="0">
+                          <a:latin typeface="Cambria Math" panose="02040503050406030204" pitchFamily="18" charset="0"/>
+                          <a:ea typeface="Cambria Math" panose="02040503050406030204" pitchFamily="18" charset="0"/>
+                        </a:rPr>
+                        <m:t>𝑁</m:t>
+                      </m:r>
+                      <m:d>
+                        <m:dPr>
+                          <m:ctrlPr>
+                            <a:rPr lang="en-MY" sz="3200" b="0" i="1" smtClean="0">
+                              <a:latin typeface="Cambria Math" panose="02040503050406030204" pitchFamily="18" charset="0"/>
+                              <a:ea typeface="Cambria Math" panose="02040503050406030204" pitchFamily="18" charset="0"/>
+                            </a:rPr>
+                          </m:ctrlPr>
+                        </m:dPr>
+                        <m:e>
+                          <m:r>
+                            <a:rPr lang="en-MY" sz="3200" b="0" i="1" smtClean="0">
+                              <a:latin typeface="Cambria Math" panose="02040503050406030204" pitchFamily="18" charset="0"/>
+                              <a:ea typeface="Cambria Math" panose="02040503050406030204" pitchFamily="18" charset="0"/>
+                            </a:rPr>
+                            <m:t>𝐵</m:t>
+                          </m:r>
+                        </m:e>
+                      </m:d>
+                      <m:r>
+                        <a:rPr lang="en-MY" sz="3200" b="0" i="1" smtClean="0">
+                          <a:latin typeface="Cambria Math" panose="02040503050406030204" pitchFamily="18" charset="0"/>
+                          <a:ea typeface="Cambria Math" panose="02040503050406030204" pitchFamily="18" charset="0"/>
+                        </a:rPr>
+                        <m:t>−</m:t>
+                      </m:r>
+                      <m:r>
+                        <a:rPr lang="en-MY" sz="3200" b="0" i="1" smtClean="0">
+                          <a:latin typeface="Cambria Math" panose="02040503050406030204" pitchFamily="18" charset="0"/>
+                          <a:ea typeface="Cambria Math" panose="02040503050406030204" pitchFamily="18" charset="0"/>
+                        </a:rPr>
+                        <m:t>𝑁</m:t>
+                      </m:r>
+                      <m:r>
+                        <a:rPr lang="en-MY" sz="3200" b="0" i="1" smtClean="0">
+                          <a:latin typeface="Cambria Math" panose="02040503050406030204" pitchFamily="18" charset="0"/>
+                          <a:ea typeface="Cambria Math" panose="02040503050406030204" pitchFamily="18" charset="0"/>
+                        </a:rPr>
+                        <m:t>(</m:t>
+                      </m:r>
+                      <m:r>
+                        <a:rPr lang="en-MY" sz="3200" b="0" i="1" smtClean="0">
+                          <a:latin typeface="Cambria Math" panose="02040503050406030204" pitchFamily="18" charset="0"/>
+                          <a:ea typeface="Cambria Math" panose="02040503050406030204" pitchFamily="18" charset="0"/>
+                        </a:rPr>
+                        <m:t>𝐴</m:t>
+                      </m:r>
+                      <m:r>
+                        <a:rPr lang="en-MY" sz="3200" b="0" i="1" smtClean="0">
+                          <a:latin typeface="Cambria Math" panose="02040503050406030204" pitchFamily="18" charset="0"/>
+                          <a:ea typeface="Cambria Math" panose="02040503050406030204" pitchFamily="18" charset="0"/>
+                        </a:rPr>
+                        <m:t>∩</m:t>
+                      </m:r>
+                      <m:r>
+                        <a:rPr lang="en-MY" sz="3200" b="0" i="1" smtClean="0">
+                          <a:latin typeface="Cambria Math" panose="02040503050406030204" pitchFamily="18" charset="0"/>
+                          <a:ea typeface="Cambria Math" panose="02040503050406030204" pitchFamily="18" charset="0"/>
+                        </a:rPr>
+                        <m:t>𝐵</m:t>
+                      </m:r>
+                      <m:r>
+                        <a:rPr lang="en-MY" sz="3200" b="0" i="1" smtClean="0">
+                          <a:latin typeface="Cambria Math" panose="02040503050406030204" pitchFamily="18" charset="0"/>
+                          <a:ea typeface="Cambria Math" panose="02040503050406030204" pitchFamily="18" charset="0"/>
+                        </a:rPr>
+                        <m:t>)</m:t>
+                      </m:r>
+                    </m:oMath>
+                  </m:oMathPara>
+                </a14:m>
+                <a:endParaRPr lang="en-MY" sz="3200" b="0" dirty="0">
+                  <a:ea typeface="Cambria Math" panose="02040503050406030204" pitchFamily="18" charset="0"/>
+                </a:endParaRPr>
+              </a:p>
+              <a:p>
+                <a:pPr marL="0" indent="0">
+                  <a:buNone/>
+                </a:pPr>
+                <a:endParaRPr lang="en-MY" sz="3200" b="0" dirty="0">
+                  <a:ea typeface="Cambria Math" panose="02040503050406030204" pitchFamily="18" charset="0"/>
+                </a:endParaRPr>
+              </a:p>
+              <a:p>
+                <a:pPr marL="0" indent="0">
+                  <a:buNone/>
+                </a:pPr>
+                <a14:m>
+                  <m:oMathPara xmlns:m="http://schemas.openxmlformats.org/officeDocument/2006/math">
+                    <m:oMathParaPr>
+                      <m:jc m:val="centerGroup"/>
+                    </m:oMathParaPr>
+                    <m:oMath xmlns:m="http://schemas.openxmlformats.org/officeDocument/2006/math">
+                      <m:r>
+                        <a:rPr lang="en-MY" sz="2400" i="1">
+                          <a:latin typeface="Cambria Math" panose="02040503050406030204" pitchFamily="18" charset="0"/>
+                          <a:ea typeface="Cambria Math" panose="02040503050406030204" pitchFamily="18" charset="0"/>
+                        </a:rPr>
+                        <m:t>𝑁</m:t>
+                      </m:r>
+                      <m:d>
+                        <m:dPr>
+                          <m:ctrlPr>
+                            <a:rPr lang="en-MY" sz="2400" i="1">
+                              <a:latin typeface="Cambria Math" panose="02040503050406030204" pitchFamily="18" charset="0"/>
+                              <a:ea typeface="Cambria Math" panose="02040503050406030204" pitchFamily="18" charset="0"/>
+                            </a:rPr>
+                          </m:ctrlPr>
+                        </m:dPr>
+                        <m:e>
+                          <m:r>
+                            <a:rPr lang="en-MY" sz="2400" i="1">
+                              <a:latin typeface="Cambria Math" panose="02040503050406030204" pitchFamily="18" charset="0"/>
+                              <a:ea typeface="Cambria Math" panose="02040503050406030204" pitchFamily="18" charset="0"/>
+                            </a:rPr>
+                            <m:t>𝐴</m:t>
+                          </m:r>
+                          <m:r>
+                            <a:rPr lang="en-MY" sz="2400" i="1">
+                              <a:latin typeface="Cambria Math" panose="02040503050406030204" pitchFamily="18" charset="0"/>
+                              <a:ea typeface="Cambria Math" panose="02040503050406030204" pitchFamily="18" charset="0"/>
+                            </a:rPr>
+                            <m:t>∪</m:t>
+                          </m:r>
+                          <m:r>
+                            <a:rPr lang="en-MY" sz="2400" b="0" i="1" smtClean="0">
+                              <a:latin typeface="Cambria Math" panose="02040503050406030204" pitchFamily="18" charset="0"/>
+                              <a:ea typeface="Cambria Math" panose="02040503050406030204" pitchFamily="18" charset="0"/>
+                            </a:rPr>
+                            <m:t>𝐵</m:t>
+                          </m:r>
+                          <m:r>
+                            <a:rPr lang="en-MY" sz="2400" b="0" i="1" smtClean="0">
+                              <a:latin typeface="Cambria Math" panose="02040503050406030204" pitchFamily="18" charset="0"/>
+                              <a:ea typeface="Cambria Math" panose="02040503050406030204" pitchFamily="18" charset="0"/>
+                            </a:rPr>
+                            <m:t>∪</m:t>
+                          </m:r>
+                          <m:r>
+                            <a:rPr lang="en-MY" sz="2400" b="0" i="1" smtClean="0">
+                              <a:latin typeface="Cambria Math" panose="02040503050406030204" pitchFamily="18" charset="0"/>
+                              <a:ea typeface="Cambria Math" panose="02040503050406030204" pitchFamily="18" charset="0"/>
+                            </a:rPr>
+                            <m:t>𝐶</m:t>
+                          </m:r>
+                        </m:e>
+                      </m:d>
+                      <m:r>
+                        <a:rPr lang="en-MY" sz="2400" i="1">
+                          <a:latin typeface="Cambria Math" panose="02040503050406030204" pitchFamily="18" charset="0"/>
+                          <a:ea typeface="Cambria Math" panose="02040503050406030204" pitchFamily="18" charset="0"/>
+                        </a:rPr>
+                        <m:t>=</m:t>
+                      </m:r>
+                      <m:r>
+                        <a:rPr lang="en-MY" sz="2400" i="1">
+                          <a:latin typeface="Cambria Math" panose="02040503050406030204" pitchFamily="18" charset="0"/>
+                          <a:ea typeface="Cambria Math" panose="02040503050406030204" pitchFamily="18" charset="0"/>
+                        </a:rPr>
+                        <m:t>𝑁</m:t>
+                      </m:r>
+                      <m:d>
+                        <m:dPr>
+                          <m:ctrlPr>
+                            <a:rPr lang="en-MY" sz="2400" i="1">
+                              <a:latin typeface="Cambria Math" panose="02040503050406030204" pitchFamily="18" charset="0"/>
+                              <a:ea typeface="Cambria Math" panose="02040503050406030204" pitchFamily="18" charset="0"/>
+                            </a:rPr>
+                          </m:ctrlPr>
+                        </m:dPr>
+                        <m:e>
+                          <m:r>
+                            <a:rPr lang="en-MY" sz="2400" i="1">
+                              <a:latin typeface="Cambria Math" panose="02040503050406030204" pitchFamily="18" charset="0"/>
+                              <a:ea typeface="Cambria Math" panose="02040503050406030204" pitchFamily="18" charset="0"/>
+                            </a:rPr>
+                            <m:t>𝐴</m:t>
+                          </m:r>
+                        </m:e>
+                      </m:d>
+                      <m:r>
+                        <a:rPr lang="en-MY" sz="2400" i="1">
+                          <a:latin typeface="Cambria Math" panose="02040503050406030204" pitchFamily="18" charset="0"/>
+                          <a:ea typeface="Cambria Math" panose="02040503050406030204" pitchFamily="18" charset="0"/>
+                        </a:rPr>
+                        <m:t>+</m:t>
+                      </m:r>
+                      <m:r>
+                        <a:rPr lang="en-MY" sz="2400" i="1">
+                          <a:latin typeface="Cambria Math" panose="02040503050406030204" pitchFamily="18" charset="0"/>
+                          <a:ea typeface="Cambria Math" panose="02040503050406030204" pitchFamily="18" charset="0"/>
+                        </a:rPr>
+                        <m:t>𝑁</m:t>
+                      </m:r>
+                      <m:d>
+                        <m:dPr>
+                          <m:ctrlPr>
+                            <a:rPr lang="en-MY" sz="2400" i="1">
+                              <a:latin typeface="Cambria Math" panose="02040503050406030204" pitchFamily="18" charset="0"/>
+                              <a:ea typeface="Cambria Math" panose="02040503050406030204" pitchFamily="18" charset="0"/>
+                            </a:rPr>
+                          </m:ctrlPr>
+                        </m:dPr>
+                        <m:e>
+                          <m:r>
+                            <a:rPr lang="en-MY" sz="2400" i="1">
+                              <a:latin typeface="Cambria Math" panose="02040503050406030204" pitchFamily="18" charset="0"/>
+                              <a:ea typeface="Cambria Math" panose="02040503050406030204" pitchFamily="18" charset="0"/>
+                            </a:rPr>
+                            <m:t>𝐵</m:t>
+                          </m:r>
+                        </m:e>
+                      </m:d>
+                      <m:r>
+                        <a:rPr lang="en-MY" sz="2400" b="0" i="1" smtClean="0">
+                          <a:latin typeface="Cambria Math" panose="02040503050406030204" pitchFamily="18" charset="0"/>
+                          <a:ea typeface="Cambria Math" panose="02040503050406030204" pitchFamily="18" charset="0"/>
+                        </a:rPr>
+                        <m:t>+</m:t>
+                      </m:r>
+                      <m:r>
+                        <a:rPr lang="en-MY" sz="2400" b="0" i="1" smtClean="0">
+                          <a:latin typeface="Cambria Math" panose="02040503050406030204" pitchFamily="18" charset="0"/>
+                          <a:ea typeface="Cambria Math" panose="02040503050406030204" pitchFamily="18" charset="0"/>
+                        </a:rPr>
+                        <m:t>𝑁</m:t>
+                      </m:r>
+                      <m:d>
+                        <m:dPr>
+                          <m:ctrlPr>
+                            <a:rPr lang="en-MY" sz="2400" b="0" i="1" smtClean="0">
+                              <a:latin typeface="Cambria Math" panose="02040503050406030204" pitchFamily="18" charset="0"/>
+                              <a:ea typeface="Cambria Math" panose="02040503050406030204" pitchFamily="18" charset="0"/>
+                            </a:rPr>
+                          </m:ctrlPr>
+                        </m:dPr>
+                        <m:e>
+                          <m:r>
+                            <a:rPr lang="en-MY" sz="2400" b="0" i="1" smtClean="0">
+                              <a:latin typeface="Cambria Math" panose="02040503050406030204" pitchFamily="18" charset="0"/>
+                              <a:ea typeface="Cambria Math" panose="02040503050406030204" pitchFamily="18" charset="0"/>
+                            </a:rPr>
+                            <m:t>𝐶</m:t>
+                          </m:r>
+                        </m:e>
+                      </m:d>
+                      <m:r>
+                        <a:rPr lang="en-MY" sz="2400" i="1">
+                          <a:latin typeface="Cambria Math" panose="02040503050406030204" pitchFamily="18" charset="0"/>
+                          <a:ea typeface="Cambria Math" panose="02040503050406030204" pitchFamily="18" charset="0"/>
+                        </a:rPr>
+                        <m:t>−</m:t>
+                      </m:r>
+                      <m:r>
+                        <a:rPr lang="en-MY" sz="2400" i="1">
+                          <a:latin typeface="Cambria Math" panose="02040503050406030204" pitchFamily="18" charset="0"/>
+                          <a:ea typeface="Cambria Math" panose="02040503050406030204" pitchFamily="18" charset="0"/>
+                        </a:rPr>
+                        <m:t>𝑁</m:t>
+                      </m:r>
+                      <m:d>
+                        <m:dPr>
+                          <m:ctrlPr>
+                            <a:rPr lang="en-MY" sz="2400" i="1">
+                              <a:latin typeface="Cambria Math" panose="02040503050406030204" pitchFamily="18" charset="0"/>
+                              <a:ea typeface="Cambria Math" panose="02040503050406030204" pitchFamily="18" charset="0"/>
+                            </a:rPr>
+                          </m:ctrlPr>
+                        </m:dPr>
+                        <m:e>
+                          <m:r>
+                            <a:rPr lang="en-MY" sz="2400" i="1">
+                              <a:latin typeface="Cambria Math" panose="02040503050406030204" pitchFamily="18" charset="0"/>
+                              <a:ea typeface="Cambria Math" panose="02040503050406030204" pitchFamily="18" charset="0"/>
+                            </a:rPr>
+                            <m:t>𝐴</m:t>
+                          </m:r>
+                          <m:r>
+                            <a:rPr lang="en-MY" sz="2400" i="1">
+                              <a:latin typeface="Cambria Math" panose="02040503050406030204" pitchFamily="18" charset="0"/>
+                              <a:ea typeface="Cambria Math" panose="02040503050406030204" pitchFamily="18" charset="0"/>
+                            </a:rPr>
+                            <m:t>∩</m:t>
+                          </m:r>
+                          <m:r>
+                            <a:rPr lang="en-MY" sz="2400" i="1">
+                              <a:latin typeface="Cambria Math" panose="02040503050406030204" pitchFamily="18" charset="0"/>
+                              <a:ea typeface="Cambria Math" panose="02040503050406030204" pitchFamily="18" charset="0"/>
+                            </a:rPr>
+                            <m:t>𝐵</m:t>
+                          </m:r>
+                        </m:e>
+                      </m:d>
+                      <m:r>
+                        <a:rPr lang="en-MY" sz="2400" b="0" i="1" smtClean="0">
+                          <a:latin typeface="Cambria Math" panose="02040503050406030204" pitchFamily="18" charset="0"/>
+                          <a:ea typeface="Cambria Math" panose="02040503050406030204" pitchFamily="18" charset="0"/>
+                        </a:rPr>
+                        <m:t>−</m:t>
+                      </m:r>
+                      <m:r>
+                        <a:rPr lang="en-MY" sz="2400" b="0" i="1" smtClean="0">
+                          <a:latin typeface="Cambria Math" panose="02040503050406030204" pitchFamily="18" charset="0"/>
+                          <a:ea typeface="Cambria Math" panose="02040503050406030204" pitchFamily="18" charset="0"/>
+                        </a:rPr>
+                        <m:t>𝑁</m:t>
+                      </m:r>
+                      <m:d>
+                        <m:dPr>
+                          <m:ctrlPr>
+                            <a:rPr lang="en-MY" sz="2400" b="0" i="1" smtClean="0">
+                              <a:latin typeface="Cambria Math" panose="02040503050406030204" pitchFamily="18" charset="0"/>
+                              <a:ea typeface="Cambria Math" panose="02040503050406030204" pitchFamily="18" charset="0"/>
+                            </a:rPr>
+                          </m:ctrlPr>
+                        </m:dPr>
+                        <m:e>
+                          <m:r>
+                            <a:rPr lang="en-MY" sz="2400" b="0" i="1" smtClean="0">
+                              <a:latin typeface="Cambria Math" panose="02040503050406030204" pitchFamily="18" charset="0"/>
+                              <a:ea typeface="Cambria Math" panose="02040503050406030204" pitchFamily="18" charset="0"/>
+                            </a:rPr>
+                            <m:t>𝐴</m:t>
+                          </m:r>
+                          <m:r>
+                            <a:rPr lang="en-MY" sz="2400" b="0" i="1" smtClean="0">
+                              <a:latin typeface="Cambria Math" panose="02040503050406030204" pitchFamily="18" charset="0"/>
+                              <a:ea typeface="Cambria Math" panose="02040503050406030204" pitchFamily="18" charset="0"/>
+                            </a:rPr>
+                            <m:t>∩</m:t>
+                          </m:r>
+                          <m:r>
+                            <a:rPr lang="en-MY" sz="2400" b="0" i="1" smtClean="0">
+                              <a:latin typeface="Cambria Math" panose="02040503050406030204" pitchFamily="18" charset="0"/>
+                              <a:ea typeface="Cambria Math" panose="02040503050406030204" pitchFamily="18" charset="0"/>
+                            </a:rPr>
+                            <m:t>𝐶</m:t>
+                          </m:r>
+                        </m:e>
+                      </m:d>
+                      <m:r>
+                        <a:rPr lang="en-MY" sz="2400" b="0" i="1" smtClean="0">
+                          <a:latin typeface="Cambria Math" panose="02040503050406030204" pitchFamily="18" charset="0"/>
+                          <a:ea typeface="Cambria Math" panose="02040503050406030204" pitchFamily="18" charset="0"/>
+                        </a:rPr>
+                        <m:t>−</m:t>
+                      </m:r>
+                      <m:r>
+                        <a:rPr lang="en-MY" sz="2400" b="0" i="1" smtClean="0">
+                          <a:latin typeface="Cambria Math" panose="02040503050406030204" pitchFamily="18" charset="0"/>
+                          <a:ea typeface="Cambria Math" panose="02040503050406030204" pitchFamily="18" charset="0"/>
+                        </a:rPr>
+                        <m:t>𝑁</m:t>
+                      </m:r>
+                      <m:d>
+                        <m:dPr>
+                          <m:ctrlPr>
+                            <a:rPr lang="en-MY" sz="2400" b="0" i="1" smtClean="0">
+                              <a:latin typeface="Cambria Math" panose="02040503050406030204" pitchFamily="18" charset="0"/>
+                              <a:ea typeface="Cambria Math" panose="02040503050406030204" pitchFamily="18" charset="0"/>
+                            </a:rPr>
+                          </m:ctrlPr>
+                        </m:dPr>
+                        <m:e>
+                          <m:r>
+                            <a:rPr lang="en-MY" sz="2400" b="0" i="1" smtClean="0">
+                              <a:latin typeface="Cambria Math" panose="02040503050406030204" pitchFamily="18" charset="0"/>
+                              <a:ea typeface="Cambria Math" panose="02040503050406030204" pitchFamily="18" charset="0"/>
+                            </a:rPr>
+                            <m:t>𝐵</m:t>
+                          </m:r>
+                          <m:r>
+                            <a:rPr lang="en-MY" sz="2400" b="0" i="1" smtClean="0">
+                              <a:latin typeface="Cambria Math" panose="02040503050406030204" pitchFamily="18" charset="0"/>
+                              <a:ea typeface="Cambria Math" panose="02040503050406030204" pitchFamily="18" charset="0"/>
+                            </a:rPr>
+                            <m:t>∩</m:t>
+                          </m:r>
+                          <m:r>
+                            <a:rPr lang="en-MY" sz="2400" b="0" i="1" smtClean="0">
+                              <a:latin typeface="Cambria Math" panose="02040503050406030204" pitchFamily="18" charset="0"/>
+                              <a:ea typeface="Cambria Math" panose="02040503050406030204" pitchFamily="18" charset="0"/>
+                            </a:rPr>
+                            <m:t>𝐶</m:t>
+                          </m:r>
+                        </m:e>
+                      </m:d>
+                      <m:r>
+                        <a:rPr lang="en-MY" sz="2400" b="0" i="1" smtClean="0">
+                          <a:latin typeface="Cambria Math" panose="02040503050406030204" pitchFamily="18" charset="0"/>
+                          <a:ea typeface="Cambria Math" panose="02040503050406030204" pitchFamily="18" charset="0"/>
+                        </a:rPr>
+                        <m:t>+</m:t>
+                      </m:r>
+                      <m:r>
+                        <a:rPr lang="en-MY" sz="2400" b="0" i="1" smtClean="0">
+                          <a:latin typeface="Cambria Math" panose="02040503050406030204" pitchFamily="18" charset="0"/>
+                          <a:ea typeface="Cambria Math" panose="02040503050406030204" pitchFamily="18" charset="0"/>
+                        </a:rPr>
+                        <m:t>𝑁</m:t>
+                      </m:r>
+                      <m:r>
+                        <a:rPr lang="en-MY" sz="2400" b="0" i="1" smtClean="0">
+                          <a:latin typeface="Cambria Math" panose="02040503050406030204" pitchFamily="18" charset="0"/>
+                          <a:ea typeface="Cambria Math" panose="02040503050406030204" pitchFamily="18" charset="0"/>
+                        </a:rPr>
+                        <m:t>(</m:t>
+                      </m:r>
+                      <m:r>
+                        <a:rPr lang="en-MY" sz="2400" b="0" i="1" smtClean="0">
+                          <a:latin typeface="Cambria Math" panose="02040503050406030204" pitchFamily="18" charset="0"/>
+                          <a:ea typeface="Cambria Math" panose="02040503050406030204" pitchFamily="18" charset="0"/>
+                        </a:rPr>
+                        <m:t>𝐴</m:t>
+                      </m:r>
+                      <m:r>
+                        <a:rPr lang="en-MY" sz="2400" b="0" i="1" smtClean="0">
+                          <a:latin typeface="Cambria Math" panose="02040503050406030204" pitchFamily="18" charset="0"/>
+                          <a:ea typeface="Cambria Math" panose="02040503050406030204" pitchFamily="18" charset="0"/>
+                        </a:rPr>
+                        <m:t>∩</m:t>
+                      </m:r>
+                      <m:r>
+                        <a:rPr lang="en-MY" sz="2400" b="0" i="1" smtClean="0">
+                          <a:latin typeface="Cambria Math" panose="02040503050406030204" pitchFamily="18" charset="0"/>
+                          <a:ea typeface="Cambria Math" panose="02040503050406030204" pitchFamily="18" charset="0"/>
+                        </a:rPr>
+                        <m:t>𝐵</m:t>
+                      </m:r>
+                      <m:r>
+                        <a:rPr lang="en-MY" sz="2400" b="0" i="1" smtClean="0">
+                          <a:latin typeface="Cambria Math" panose="02040503050406030204" pitchFamily="18" charset="0"/>
+                          <a:ea typeface="Cambria Math" panose="02040503050406030204" pitchFamily="18" charset="0"/>
+                        </a:rPr>
+                        <m:t>∩</m:t>
+                      </m:r>
+                      <m:r>
+                        <a:rPr lang="en-MY" sz="2400" b="0" i="1" smtClean="0">
+                          <a:latin typeface="Cambria Math" panose="02040503050406030204" pitchFamily="18" charset="0"/>
+                          <a:ea typeface="Cambria Math" panose="02040503050406030204" pitchFamily="18" charset="0"/>
+                        </a:rPr>
+                        <m:t>𝐶</m:t>
+                      </m:r>
+                      <m:r>
+                        <a:rPr lang="en-MY" sz="2400" b="0" i="1" smtClean="0">
+                          <a:latin typeface="Cambria Math" panose="02040503050406030204" pitchFamily="18" charset="0"/>
+                          <a:ea typeface="Cambria Math" panose="02040503050406030204" pitchFamily="18" charset="0"/>
+                        </a:rPr>
+                        <m:t>)</m:t>
+                      </m:r>
+                    </m:oMath>
+                  </m:oMathPara>
+                </a14:m>
+                <a:endParaRPr lang="en-MY" sz="2400" dirty="0">
+                  <a:ea typeface="Cambria Math" panose="02040503050406030204" pitchFamily="18" charset="0"/>
+                </a:endParaRPr>
+              </a:p>
+              <a:p>
+                <a:pPr marL="0" indent="0">
+                  <a:buNone/>
+                </a:pPr>
+                <a:endParaRPr lang="en-MY" sz="3200" dirty="0">
+                  <a:ea typeface="Cambria Math" panose="02040503050406030204" pitchFamily="18" charset="0"/>
+                </a:endParaRPr>
+              </a:p>
+              <a:p>
+                <a:pPr marL="0" indent="0">
+                  <a:buNone/>
+                </a:pPr>
+                <a:endParaRPr lang="en-MY" sz="3200" b="0" dirty="0">
+                  <a:ea typeface="Cambria Math" panose="02040503050406030204" pitchFamily="18" charset="0"/>
+                </a:endParaRPr>
+              </a:p>
+              <a:p>
+                <a:pPr marL="0" indent="0">
+                  <a:buNone/>
+                </a:pPr>
+                <a:endParaRPr lang="en-MY" sz="3200" b="0" dirty="0"/>
+              </a:p>
+              <a:p>
+                <a:pPr marL="0" indent="0">
+                  <a:buNone/>
+                </a:pPr>
+                <a:endParaRPr lang="en-MY" sz="3200" dirty="0"/>
+              </a:p>
+              <a:p>
+                <a:pPr marL="0" indent="0">
+                  <a:buNone/>
+                </a:pPr>
+                <a:endParaRPr lang="en-MY" sz="3200" dirty="0"/>
+              </a:p>
+              <a:p>
+                <a:pPr marL="0" indent="0">
+                  <a:buNone/>
+                </a:pPr>
+                <a:endParaRPr lang="en-MY" sz="3200" dirty="0"/>
+              </a:p>
+              <a:p>
+                <a:pPr marL="0" indent="0">
+                  <a:buNone/>
+                </a:pPr>
+                <a:endParaRPr lang="en-MY" sz="3200" dirty="0"/>
+              </a:p>
+            </p:txBody>
+          </p:sp>
+        </mc:Choice>
+        <mc:Fallback>
+          <p:sp>
+            <p:nvSpPr>
+              <p:cNvPr id="3" name="Content Placeholder 2">
+                <a:extLst>
+                  <a:ext uri="{FF2B5EF4-FFF2-40B4-BE49-F238E27FC236}">
+                    <a16:creationId xmlns:a16="http://schemas.microsoft.com/office/drawing/2014/main" id="{7A200C48-F6E6-438D-8B6C-3933FFD4DEBF}"/>
+                  </a:ext>
+                </a:extLst>
+              </p:cNvPr>
+              <p:cNvSpPr>
+                <a:spLocks noGrp="1" noRot="1" noChangeAspect="1" noMove="1" noResize="1" noEditPoints="1" noAdjustHandles="1" noChangeArrowheads="1" noChangeShapeType="1" noTextEdit="1"/>
+              </p:cNvSpPr>
+              <p:nvPr>
+                <p:ph idx="1"/>
+              </p:nvPr>
+            </p:nvSpPr>
+            <p:spPr>
+              <a:blipFill>
+                <a:blip r:embed="rId2"/>
+                <a:stretch>
+                  <a:fillRect l="-2061" t="-3182" r="-242"/>
+                </a:stretch>
+              </a:blipFill>
+            </p:spPr>
+            <p:txBody>
+              <a:bodyPr/>
+              <a:lstStyle/>
+              <a:p>
+                <a:r>
+                  <a:rPr lang="en-MY">
+                    <a:noFill/>
+                  </a:rPr>
+                  <a:t> </a:t>
+                </a:r>
+              </a:p>
+            </p:txBody>
+          </p:sp>
+        </mc:Fallback>
+      </mc:AlternateContent>
+    </p:spTree>
+    <p:extLst>
+      <p:ext uri="{BB962C8B-B14F-4D97-AF65-F5344CB8AC3E}">
+        <p14:creationId xmlns:p14="http://schemas.microsoft.com/office/powerpoint/2010/main" val="1221268262"/>
+      </p:ext>
+    </p:extLst>
+  </p:cSld>
+  <p:clrMapOvr>
+    <a:masterClrMapping/>
+  </p:clrMapOvr>
+</p:sld>
+</file>
+
+<file path=ppt/slides/slide8.xml><?xml version="1.0" encoding="utf-8"?>
+<p:sld xmlns:a="http://schemas.openxmlformats.org/drawingml/2006/main" xmlns:r="http://schemas.openxmlformats.org/officeDocument/2006/relationships" xmlns:p="http://schemas.openxmlformats.org/presentationml/2006/main">
+  <p:cSld>
+    <p:spTree>
+      <p:nvGrpSpPr>
+        <p:cNvPr id="1" name=""/>
+        <p:cNvGrpSpPr/>
+        <p:nvPr/>
+      </p:nvGrpSpPr>
+      <p:grpSpPr>
+        <a:xfrm>
+          <a:off x="0" y="0"/>
+          <a:ext cx="0" cy="0"/>
+          <a:chOff x="0" y="0"/>
+          <a:chExt cx="0" cy="0"/>
+        </a:xfrm>
+      </p:grpSpPr>
+      <p:sp>
+        <p:nvSpPr>
+          <p:cNvPr id="2" name="Title 1">
+            <a:extLst>
+              <a:ext uri="{FF2B5EF4-FFF2-40B4-BE49-F238E27FC236}">
+                <a16:creationId xmlns:a16="http://schemas.microsoft.com/office/drawing/2014/main" id="{2B3B7CF7-821D-432B-AB6B-521D80545732}"/>
+              </a:ext>
+            </a:extLst>
+          </p:cNvPr>
+          <p:cNvSpPr>
+            <a:spLocks noGrp="1"/>
+          </p:cNvSpPr>
+          <p:nvPr>
+            <p:ph type="title"/>
+          </p:nvPr>
+        </p:nvSpPr>
+        <p:spPr/>
+        <p:txBody>
+          <a:bodyPr/>
+          <a:lstStyle/>
+          <a:p>
+            <a:r>
+              <a:rPr lang="en-MY" dirty="0"/>
+              <a:t>Pigeonhole Principle</a:t>
+            </a:r>
+          </a:p>
+        </p:txBody>
+      </p:sp>
+      <p:sp>
+        <p:nvSpPr>
+          <p:cNvPr id="3" name="Content Placeholder 2">
+            <a:extLst>
+              <a:ext uri="{FF2B5EF4-FFF2-40B4-BE49-F238E27FC236}">
+                <a16:creationId xmlns:a16="http://schemas.microsoft.com/office/drawing/2014/main" id="{7A200C48-F6E6-438D-8B6C-3933FFD4DEBF}"/>
+              </a:ext>
+            </a:extLst>
+          </p:cNvPr>
+          <p:cNvSpPr>
+            <a:spLocks noGrp="1"/>
+          </p:cNvSpPr>
+          <p:nvPr>
+            <p:ph idx="1"/>
+          </p:nvPr>
+        </p:nvSpPr>
+        <p:spPr/>
+        <p:txBody>
+          <a:bodyPr>
+            <a:normAutofit/>
+          </a:bodyPr>
+          <a:lstStyle/>
+          <a:p>
+            <a:pPr marL="0" indent="0">
+              <a:buNone/>
+            </a:pPr>
+            <a:r>
+              <a:rPr lang="en-MY" sz="3200" b="0" dirty="0">
+                <a:ea typeface="Cambria Math" panose="02040503050406030204" pitchFamily="18" charset="0"/>
+              </a:rPr>
+              <a:t>A function from one finite set to a smaller finite set cannot be one-to-one: there must be at least 2 elements in the domain that have the same image in the co-domain.</a:t>
+            </a:r>
+          </a:p>
+          <a:p>
+            <a:pPr marL="0" indent="0">
+              <a:buNone/>
+            </a:pPr>
+            <a:endParaRPr lang="en-MY" sz="3200" dirty="0">
+              <a:ea typeface="Cambria Math" panose="02040503050406030204" pitchFamily="18" charset="0"/>
+            </a:endParaRPr>
+          </a:p>
+          <a:p>
+            <a:pPr marL="0" indent="0">
+              <a:buNone/>
+            </a:pPr>
+            <a:r>
+              <a:rPr lang="en-MY" sz="3200" b="0" dirty="0">
+                <a:ea typeface="Cambria Math" panose="02040503050406030204" pitchFamily="18" charset="0"/>
+              </a:rPr>
+              <a:t>Basically, if pigeons &gt; pigeonholes, then some pigeonholes need to take in more than 1 pigeon</a:t>
+            </a:r>
+          </a:p>
+          <a:p>
+            <a:pPr marL="0" indent="0">
+              <a:buNone/>
+            </a:pPr>
+            <a:endParaRPr lang="en-MY" sz="3200" b="0" dirty="0">
+              <a:ea typeface="Cambria Math" panose="02040503050406030204" pitchFamily="18" charset="0"/>
+            </a:endParaRPr>
+          </a:p>
+          <a:p>
+            <a:pPr marL="0" indent="0">
+              <a:buNone/>
+            </a:pPr>
+            <a:endParaRPr lang="en-MY" sz="3200" b="0" dirty="0"/>
+          </a:p>
+          <a:p>
+            <a:pPr marL="0" indent="0">
+              <a:buNone/>
+            </a:pPr>
+            <a:endParaRPr lang="en-MY" sz="3200" dirty="0"/>
+          </a:p>
+          <a:p>
+            <a:pPr marL="0" indent="0">
+              <a:buNone/>
+            </a:pPr>
+            <a:endParaRPr lang="en-MY" sz="3200" dirty="0"/>
+          </a:p>
+          <a:p>
+            <a:pPr marL="0" indent="0">
+              <a:buNone/>
+            </a:pPr>
+            <a:endParaRPr lang="en-MY" sz="3200" dirty="0"/>
+          </a:p>
+          <a:p>
+            <a:pPr marL="0" indent="0">
+              <a:buNone/>
+            </a:pPr>
+            <a:endParaRPr lang="en-MY" sz="3200" dirty="0"/>
+          </a:p>
+        </p:txBody>
+      </p:sp>
+    </p:spTree>
+    <p:extLst>
+      <p:ext uri="{BB962C8B-B14F-4D97-AF65-F5344CB8AC3E}">
+        <p14:creationId xmlns:p14="http://schemas.microsoft.com/office/powerpoint/2010/main" val="3123341102"/>
       </p:ext>
     </p:extLst>
   </p:cSld>

</xml_diff>